<commit_message>
performance updates; added final_GO_info.csv
</commit_message>
<xml_diff>
--- a/docs/evans_final.pptx
+++ b/docs/evans_final.pptx
@@ -10,6 +10,7 @@
     <p:sldId id="258" r:id="rId4"/>
     <p:sldId id="259" r:id="rId5"/>
     <p:sldId id="260" r:id="rId6"/>
+    <p:sldId id="261" r:id="rId7"/>
   </p:sldIdLst>
   <p:sldSz cx="12192000" cy="6858000"/>
   <p:notesSz cx="6858000" cy="9144000"/>
@@ -108,6 +109,11 @@
       </a:defRPr>
     </a:lvl9pPr>
   </p:defaultTextStyle>
+  <p:extLst>
+    <p:ext uri="{EFAFB233-063F-42B5-8137-9DF3F51BA10A}">
+      <p15:sldGuideLst xmlns:p15="http://schemas.microsoft.com/office/powerpoint/2012/main"/>
+    </p:ext>
+  </p:extLst>
 </p:presentation>
 </file>
 
@@ -258,7 +264,7 @@
           <a:p>
             <a:fld id="{45C3DD7F-5439-48F2-B019-AA1C7BD24A14}" type="datetimeFigureOut">
               <a:rPr lang="en-US" smtClean="0"/>
-              <a:t>3/11/2020</a:t>
+              <a:t>3/14/2020</a:t>
             </a:fld>
             <a:endParaRPr lang="en-US"/>
           </a:p>
@@ -456,7 +462,7 @@
           <a:p>
             <a:fld id="{45C3DD7F-5439-48F2-B019-AA1C7BD24A14}" type="datetimeFigureOut">
               <a:rPr lang="en-US" smtClean="0"/>
-              <a:t>3/11/2020</a:t>
+              <a:t>3/14/2020</a:t>
             </a:fld>
             <a:endParaRPr lang="en-US"/>
           </a:p>
@@ -664,7 +670,7 @@
           <a:p>
             <a:fld id="{45C3DD7F-5439-48F2-B019-AA1C7BD24A14}" type="datetimeFigureOut">
               <a:rPr lang="en-US" smtClean="0"/>
-              <a:t>3/11/2020</a:t>
+              <a:t>3/14/2020</a:t>
             </a:fld>
             <a:endParaRPr lang="en-US"/>
           </a:p>
@@ -862,7 +868,7 @@
           <a:p>
             <a:fld id="{45C3DD7F-5439-48F2-B019-AA1C7BD24A14}" type="datetimeFigureOut">
               <a:rPr lang="en-US" smtClean="0"/>
-              <a:t>3/11/2020</a:t>
+              <a:t>3/14/2020</a:t>
             </a:fld>
             <a:endParaRPr lang="en-US"/>
           </a:p>
@@ -1137,7 +1143,7 @@
           <a:p>
             <a:fld id="{45C3DD7F-5439-48F2-B019-AA1C7BD24A14}" type="datetimeFigureOut">
               <a:rPr lang="en-US" smtClean="0"/>
-              <a:t>3/11/2020</a:t>
+              <a:t>3/14/2020</a:t>
             </a:fld>
             <a:endParaRPr lang="en-US"/>
           </a:p>
@@ -1402,7 +1408,7 @@
           <a:p>
             <a:fld id="{45C3DD7F-5439-48F2-B019-AA1C7BD24A14}" type="datetimeFigureOut">
               <a:rPr lang="en-US" smtClean="0"/>
-              <a:t>3/11/2020</a:t>
+              <a:t>3/14/2020</a:t>
             </a:fld>
             <a:endParaRPr lang="en-US"/>
           </a:p>
@@ -1814,7 +1820,7 @@
           <a:p>
             <a:fld id="{45C3DD7F-5439-48F2-B019-AA1C7BD24A14}" type="datetimeFigureOut">
               <a:rPr lang="en-US" smtClean="0"/>
-              <a:t>3/11/2020</a:t>
+              <a:t>3/14/2020</a:t>
             </a:fld>
             <a:endParaRPr lang="en-US"/>
           </a:p>
@@ -1955,7 +1961,7 @@
           <a:p>
             <a:fld id="{45C3DD7F-5439-48F2-B019-AA1C7BD24A14}" type="datetimeFigureOut">
               <a:rPr lang="en-US" smtClean="0"/>
-              <a:t>3/11/2020</a:t>
+              <a:t>3/14/2020</a:t>
             </a:fld>
             <a:endParaRPr lang="en-US"/>
           </a:p>
@@ -2068,7 +2074,7 @@
           <a:p>
             <a:fld id="{45C3DD7F-5439-48F2-B019-AA1C7BD24A14}" type="datetimeFigureOut">
               <a:rPr lang="en-US" smtClean="0"/>
-              <a:t>3/11/2020</a:t>
+              <a:t>3/14/2020</a:t>
             </a:fld>
             <a:endParaRPr lang="en-US"/>
           </a:p>
@@ -2379,7 +2385,7 @@
           <a:p>
             <a:fld id="{45C3DD7F-5439-48F2-B019-AA1C7BD24A14}" type="datetimeFigureOut">
               <a:rPr lang="en-US" smtClean="0"/>
-              <a:t>3/11/2020</a:t>
+              <a:t>3/14/2020</a:t>
             </a:fld>
             <a:endParaRPr lang="en-US"/>
           </a:p>
@@ -2667,7 +2673,7 @@
           <a:p>
             <a:fld id="{45C3DD7F-5439-48F2-B019-AA1C7BD24A14}" type="datetimeFigureOut">
               <a:rPr lang="en-US" smtClean="0"/>
-              <a:t>3/11/2020</a:t>
+              <a:t>3/14/2020</a:t>
             </a:fld>
             <a:endParaRPr lang="en-US"/>
           </a:p>
@@ -2908,7 +2914,7 @@
           <a:p>
             <a:fld id="{45C3DD7F-5439-48F2-B019-AA1C7BD24A14}" type="datetimeFigureOut">
               <a:rPr lang="en-US" smtClean="0"/>
-              <a:t>3/11/2020</a:t>
+              <a:t>3/14/2020</a:t>
             </a:fld>
             <a:endParaRPr lang="en-US"/>
           </a:p>
@@ -3791,8 +3797,12 @@
           </a:p>
           <a:p>
             <a:r>
+              <a:rPr lang="en-US"/>
+              <a:t>199 </a:t>
+            </a:r>
+            <a:r>
               <a:rPr lang="en-US" dirty="0"/>
-              <a:t>197 Genes </a:t>
+              <a:t>Genes </a:t>
             </a:r>
           </a:p>
         </p:txBody>
@@ -3872,7 +3882,7 @@
         <p:spPr>
           <a:xfrm>
             <a:off x="8953500" y="933450"/>
-            <a:ext cx="1433277" cy="369332"/>
+            <a:ext cx="3121590" cy="2308324"/>
           </a:xfrm>
           <a:prstGeom prst="rect">
             <a:avLst/>
@@ -3880,22 +3890,366 @@
           <a:noFill/>
         </p:spPr>
         <p:txBody>
-          <a:bodyPr wrap="none" rtlCol="0">
+          <a:bodyPr wrap="square" rtlCol="0">
             <a:spAutoFit/>
           </a:bodyPr>
           <a:lstStyle/>
           <a:p>
             <a:r>
               <a:rPr lang="en-US" dirty="0"/>
-              <a:t>Full Network </a:t>
-            </a:r>
-          </a:p>
-        </p:txBody>
-      </p:sp>
+              <a:t>Full Network</a:t>
+            </a:r>
+          </a:p>
+          <a:p>
+            <a:pPr marL="285750" indent="-285750">
+              <a:buFontTx/>
+              <a:buChar char="-"/>
+            </a:pPr>
+            <a:r>
+              <a:rPr lang="en-US" dirty="0"/>
+              <a:t>27 GO biological processes</a:t>
+            </a:r>
+          </a:p>
+          <a:p>
+            <a:pPr marL="742950" lvl="1" indent="-285750">
+              <a:buFontTx/>
+              <a:buChar char="-"/>
+            </a:pPr>
+            <a:r>
+              <a:rPr lang="en-US" dirty="0"/>
+              <a:t>MAPK cascade + major overlapping pathways </a:t>
+            </a:r>
+          </a:p>
+          <a:p>
+            <a:pPr marL="285750" indent="-285750">
+              <a:buFontTx/>
+              <a:buChar char="-"/>
+            </a:pPr>
+            <a:r>
+              <a:rPr lang="en-US" dirty="0"/>
+              <a:t>1027 Genes  </a:t>
+            </a:r>
+          </a:p>
+          <a:p>
+            <a:pPr marL="285750" indent="-285750">
+              <a:buFontTx/>
+              <a:buChar char="-"/>
+            </a:pPr>
+            <a:endParaRPr lang="en-US" dirty="0"/>
+          </a:p>
+          <a:p>
+            <a:pPr marL="285750" indent="-285750">
+              <a:buFontTx/>
+              <a:buChar char="-"/>
+            </a:pPr>
+            <a:r>
+              <a:rPr lang="en-US" dirty="0"/>
+              <a:t>MAPK Cascade = GO0000165</a:t>
+            </a:r>
+          </a:p>
+        </p:txBody>
+      </p:sp>
+      <p:sp>
+        <p:nvSpPr>
+          <p:cNvPr id="7" name="Rectangle 6">
+            <a:extLst>
+              <a:ext uri="{FF2B5EF4-FFF2-40B4-BE49-F238E27FC236}">
+                <a16:creationId xmlns:a16="http://schemas.microsoft.com/office/drawing/2014/main" id="{26AD3EAF-451F-48E5-9E06-95A687EBDD7C}"/>
+              </a:ext>
+            </a:extLst>
+          </p:cNvPr>
+          <p:cNvSpPr/>
+          <p:nvPr/>
+        </p:nvSpPr>
+        <p:spPr>
+          <a:xfrm>
+            <a:off x="7289800" y="1231900"/>
+            <a:ext cx="1171650" cy="203200"/>
+          </a:xfrm>
+          <a:prstGeom prst="rect">
+            <a:avLst/>
+          </a:prstGeom>
+          <a:noFill/>
+          <a:ln>
+            <a:solidFill>
+              <a:srgbClr val="FF0000"/>
+            </a:solidFill>
+          </a:ln>
+        </p:spPr>
+        <p:style>
+          <a:lnRef idx="2">
+            <a:schemeClr val="accent1">
+              <a:shade val="50000"/>
+            </a:schemeClr>
+          </a:lnRef>
+          <a:fillRef idx="1">
+            <a:schemeClr val="accent1"/>
+          </a:fillRef>
+          <a:effectRef idx="0">
+            <a:schemeClr val="accent1"/>
+          </a:effectRef>
+          <a:fontRef idx="minor">
+            <a:schemeClr val="lt1"/>
+          </a:fontRef>
+        </p:style>
+        <p:txBody>
+          <a:bodyPr rtlCol="0" anchor="ctr"/>
+          <a:lstStyle/>
+          <a:p>
+            <a:pPr algn="ctr"/>
+            <a:endParaRPr lang="en-US"/>
+          </a:p>
+        </p:txBody>
+      </p:sp>
+      <p:sp>
+        <p:nvSpPr>
+          <p:cNvPr id="8" name="Rectangle 7">
+            <a:extLst>
+              <a:ext uri="{FF2B5EF4-FFF2-40B4-BE49-F238E27FC236}">
+                <a16:creationId xmlns:a16="http://schemas.microsoft.com/office/drawing/2014/main" id="{BFB83B21-8A20-4C98-A81D-DDA3BDB62C75}"/>
+              </a:ext>
+            </a:extLst>
+          </p:cNvPr>
+          <p:cNvSpPr/>
+          <p:nvPr/>
+        </p:nvSpPr>
+        <p:spPr>
+          <a:xfrm>
+            <a:off x="8953500" y="2565400"/>
+            <a:ext cx="2108200" cy="676374"/>
+          </a:xfrm>
+          <a:prstGeom prst="rect">
+            <a:avLst/>
+          </a:prstGeom>
+          <a:noFill/>
+          <a:ln>
+            <a:solidFill>
+              <a:srgbClr val="FF0000"/>
+            </a:solidFill>
+          </a:ln>
+        </p:spPr>
+        <p:style>
+          <a:lnRef idx="2">
+            <a:schemeClr val="accent1">
+              <a:shade val="50000"/>
+            </a:schemeClr>
+          </a:lnRef>
+          <a:fillRef idx="1">
+            <a:schemeClr val="accent1"/>
+          </a:fillRef>
+          <a:effectRef idx="0">
+            <a:schemeClr val="accent1"/>
+          </a:effectRef>
+          <a:fontRef idx="minor">
+            <a:schemeClr val="lt1"/>
+          </a:fontRef>
+        </p:style>
+        <p:txBody>
+          <a:bodyPr rtlCol="0" anchor="ctr"/>
+          <a:lstStyle/>
+          <a:p>
+            <a:pPr algn="ctr"/>
+            <a:endParaRPr lang="en-US"/>
+          </a:p>
+        </p:txBody>
+      </p:sp>
+      <p:cxnSp>
+        <p:nvCxnSpPr>
+          <p:cNvPr id="10" name="Connector: Elbow 9">
+            <a:extLst>
+              <a:ext uri="{FF2B5EF4-FFF2-40B4-BE49-F238E27FC236}">
+                <a16:creationId xmlns:a16="http://schemas.microsoft.com/office/drawing/2014/main" id="{A8E23B32-FC4C-4814-9DC1-DB8847395AB5}"/>
+              </a:ext>
+            </a:extLst>
+          </p:cNvPr>
+          <p:cNvCxnSpPr>
+            <a:stCxn id="8" idx="1"/>
+            <a:endCxn id="7" idx="3"/>
+          </p:cNvCxnSpPr>
+          <p:nvPr/>
+        </p:nvCxnSpPr>
+        <p:spPr>
+          <a:xfrm rot="10800000">
+            <a:off x="8461450" y="1333501"/>
+            <a:ext cx="492050" cy="1570087"/>
+          </a:xfrm>
+          <a:prstGeom prst="bentConnector3">
+            <a:avLst/>
+          </a:prstGeom>
+          <a:ln>
+            <a:tailEnd type="triangle"/>
+          </a:ln>
+        </p:spPr>
+        <p:style>
+          <a:lnRef idx="1">
+            <a:schemeClr val="accent1"/>
+          </a:lnRef>
+          <a:fillRef idx="0">
+            <a:schemeClr val="accent1"/>
+          </a:fillRef>
+          <a:effectRef idx="0">
+            <a:schemeClr val="accent1"/>
+          </a:effectRef>
+          <a:fontRef idx="minor">
+            <a:schemeClr val="tx1"/>
+          </a:fontRef>
+        </p:style>
+      </p:cxnSp>
     </p:spTree>
     <p:extLst>
       <p:ext uri="{BB962C8B-B14F-4D97-AF65-F5344CB8AC3E}">
         <p14:creationId xmlns:p14="http://schemas.microsoft.com/office/powerpoint/2010/main" val="2494168616"/>
+      </p:ext>
+    </p:extLst>
+  </p:cSld>
+  <p:clrMapOvr>
+    <a:masterClrMapping/>
+  </p:clrMapOvr>
+</p:sld>
+</file>
+
+<file path=ppt/slides/slide6.xml><?xml version="1.0" encoding="utf-8"?>
+<p:sld xmlns:a="http://schemas.openxmlformats.org/drawingml/2006/main" xmlns:r="http://schemas.openxmlformats.org/officeDocument/2006/relationships" xmlns:p="http://schemas.openxmlformats.org/presentationml/2006/main">
+  <p:cSld>
+    <p:spTree>
+      <p:nvGrpSpPr>
+        <p:cNvPr id="1" name=""/>
+        <p:cNvGrpSpPr/>
+        <p:nvPr/>
+      </p:nvGrpSpPr>
+      <p:grpSpPr>
+        <a:xfrm>
+          <a:off x="0" y="0"/>
+          <a:ext cx="0" cy="0"/>
+          <a:chOff x="0" y="0"/>
+          <a:chExt cx="0" cy="0"/>
+        </a:xfrm>
+      </p:grpSpPr>
+      <p:sp>
+        <p:nvSpPr>
+          <p:cNvPr id="2" name="Title 1">
+            <a:extLst>
+              <a:ext uri="{FF2B5EF4-FFF2-40B4-BE49-F238E27FC236}">
+                <a16:creationId xmlns:a16="http://schemas.microsoft.com/office/drawing/2014/main" id="{E7428B88-4625-418F-8FD6-C74A76192440}"/>
+              </a:ext>
+            </a:extLst>
+          </p:cNvPr>
+          <p:cNvSpPr>
+            <a:spLocks noGrp="1"/>
+          </p:cNvSpPr>
+          <p:nvPr>
+            <p:ph type="title"/>
+          </p:nvPr>
+        </p:nvSpPr>
+        <p:spPr/>
+        <p:txBody>
+          <a:bodyPr/>
+          <a:lstStyle/>
+          <a:p>
+            <a:r>
+              <a:rPr lang="en-US" dirty="0"/>
+              <a:t>Learned Edge Weights </a:t>
+            </a:r>
+          </a:p>
+        </p:txBody>
+      </p:sp>
+      <p:pic>
+        <p:nvPicPr>
+          <p:cNvPr id="4" name="Picture 3">
+            <a:extLst>
+              <a:ext uri="{FF2B5EF4-FFF2-40B4-BE49-F238E27FC236}">
+                <a16:creationId xmlns:a16="http://schemas.microsoft.com/office/drawing/2014/main" id="{BA50380A-F3E5-4F40-8D20-0299095C58D2}"/>
+              </a:ext>
+            </a:extLst>
+          </p:cNvPr>
+          <p:cNvPicPr>
+            <a:picLocks noChangeAspect="1"/>
+          </p:cNvPicPr>
+          <p:nvPr/>
+        </p:nvPicPr>
+        <p:blipFill>
+          <a:blip r:embed="rId2"/>
+          <a:stretch>
+            <a:fillRect/>
+          </a:stretch>
+        </p:blipFill>
+        <p:spPr>
+          <a:xfrm>
+            <a:off x="0" y="1533525"/>
+            <a:ext cx="6934200" cy="5324475"/>
+          </a:xfrm>
+          <a:prstGeom prst="rect">
+            <a:avLst/>
+          </a:prstGeom>
+        </p:spPr>
+      </p:pic>
+      <p:sp>
+        <p:nvSpPr>
+          <p:cNvPr id="5" name="TextBox 4">
+            <a:extLst>
+              <a:ext uri="{FF2B5EF4-FFF2-40B4-BE49-F238E27FC236}">
+                <a16:creationId xmlns:a16="http://schemas.microsoft.com/office/drawing/2014/main" id="{202DBA15-597C-4F03-8CE7-AB28BA8CE797}"/>
+              </a:ext>
+            </a:extLst>
+          </p:cNvPr>
+          <p:cNvSpPr txBox="1"/>
+          <p:nvPr/>
+        </p:nvSpPr>
+        <p:spPr>
+          <a:xfrm>
+            <a:off x="7629525" y="2124075"/>
+            <a:ext cx="3801169" cy="923330"/>
+          </a:xfrm>
+          <a:prstGeom prst="rect">
+            <a:avLst/>
+          </a:prstGeom>
+          <a:noFill/>
+        </p:spPr>
+        <p:txBody>
+          <a:bodyPr wrap="none" rtlCol="0">
+            <a:spAutoFit/>
+          </a:bodyPr>
+          <a:lstStyle/>
+          <a:p>
+            <a:r>
+              <a:rPr lang="en-US" dirty="0"/>
+              <a:t>Node size ~ abs </a:t>
+            </a:r>
+            <a:r>
+              <a:rPr lang="en-US" dirty="0" err="1"/>
+              <a:t>val</a:t>
+            </a:r>
+            <a:r>
+              <a:rPr lang="en-US" dirty="0"/>
+              <a:t> self-edge weight</a:t>
+            </a:r>
+          </a:p>
+          <a:p>
+            <a:r>
+              <a:rPr lang="en-US" dirty="0"/>
+              <a:t>Edge color ~ positive / negative weight</a:t>
+            </a:r>
+          </a:p>
+          <a:p>
+            <a:r>
+              <a:rPr lang="en-US" dirty="0"/>
+              <a:t>Edge width ~ abs </a:t>
+            </a:r>
+            <a:r>
+              <a:rPr lang="en-US" dirty="0" err="1"/>
+              <a:t>val</a:t>
+            </a:r>
+            <a:r>
+              <a:rPr lang="en-US" dirty="0"/>
+              <a:t> edge weight</a:t>
+            </a:r>
+          </a:p>
+        </p:txBody>
+      </p:sp>
+    </p:spTree>
+    <p:extLst>
+      <p:ext uri="{BB962C8B-B14F-4D97-AF65-F5344CB8AC3E}">
+        <p14:creationId xmlns:p14="http://schemas.microsoft.com/office/powerpoint/2010/main" val="657139790"/>
       </p:ext>
     </p:extLst>
   </p:cSld>

</xml_diff>

<commit_message>
added notes to ppt ; minor performance.ipynb
</commit_message>
<xml_diff>
--- a/docs/evans_final.pptx
+++ b/docs/evans_final.pptx
@@ -211,7 +211,7 @@
           <a:p>
             <a:fld id="{198007F9-CA33-452B-8223-7BA6E3558F08}" type="datetimeFigureOut">
               <a:rPr lang="en-US" smtClean="0"/>
-              <a:t>3/14/2020</a:t>
+              <a:t>3/15/2020</a:t>
             </a:fld>
             <a:endParaRPr lang="en-US"/>
           </a:p>
@@ -522,120 +522,26 @@
           <a:bodyPr/>
           <a:lstStyle/>
           <a:p>
-            <a:pPr marL="285750" indent="-285750">
-              <a:buFont typeface="Arial" panose="020B0604020202020204" pitchFamily="34" charset="0"/>
-              <a:buChar char="•"/>
-            </a:pPr>
-            <a:r>
-              <a:rPr lang="en-US" sz="2000" dirty="0"/>
-              <a:t>Produce ~5 shRNA per protein coding gene</a:t>
-            </a:r>
-          </a:p>
-          <a:p>
-            <a:pPr marL="285750" indent="-285750">
-              <a:buFont typeface="Arial" panose="020B0604020202020204" pitchFamily="34" charset="0"/>
-              <a:buChar char="•"/>
-            </a:pPr>
-            <a:r>
-              <a:rPr lang="en-US" sz="2000" dirty="0"/>
-              <a:t>In a given cell-line in-vitro: </a:t>
-            </a:r>
-          </a:p>
-          <a:p>
-            <a:pPr marL="742950" lvl="1" indent="-285750">
-              <a:buFont typeface="Arial" panose="020B0604020202020204" pitchFamily="34" charset="0"/>
-              <a:buChar char="•"/>
-            </a:pPr>
-            <a:r>
-              <a:rPr lang="en-US" sz="2000" dirty="0"/>
-              <a:t>Transfect shRNA(s) with multiplicity of ~0.3 </a:t>
-            </a:r>
-          </a:p>
-          <a:p>
-            <a:pPr marL="742950" lvl="1" indent="-285750">
-              <a:buFont typeface="Arial" panose="020B0604020202020204" pitchFamily="34" charset="0"/>
-              <a:buChar char="•"/>
-            </a:pPr>
-            <a:r>
-              <a:rPr lang="en-US" sz="2000" dirty="0"/>
-              <a:t>Culture cells for period of time (~16 doublings) </a:t>
-            </a:r>
-          </a:p>
-          <a:p>
-            <a:pPr marL="742950" lvl="1" indent="-285750">
-              <a:buFont typeface="Arial" panose="020B0604020202020204" pitchFamily="34" charset="0"/>
-              <a:buChar char="•"/>
-            </a:pPr>
-            <a:r>
-              <a:rPr lang="en-US" sz="2000" dirty="0"/>
-              <a:t>Isolate the shRNA sequences by PCR amplification </a:t>
-            </a:r>
-          </a:p>
-          <a:p>
-            <a:pPr marL="742950" lvl="1" indent="-285750">
-              <a:buFont typeface="Arial" panose="020B0604020202020204" pitchFamily="34" charset="0"/>
-              <a:buChar char="•"/>
-            </a:pPr>
-            <a:r>
-              <a:rPr lang="en-US" sz="2000" dirty="0"/>
-              <a:t>Measure relative abundance of each shRNA </a:t>
-            </a:r>
-          </a:p>
-          <a:p>
-            <a:pPr marL="742950" lvl="1" indent="-285750">
-              <a:buFont typeface="Arial" panose="020B0604020202020204" pitchFamily="34" charset="0"/>
-              <a:buChar char="•"/>
-            </a:pPr>
-            <a:r>
-              <a:rPr lang="en-US" sz="2000" dirty="0"/>
-              <a:t>Output variable is log transformed relative abundance</a:t>
-            </a:r>
-          </a:p>
-          <a:p>
-            <a:pPr marL="285750" indent="-285750">
-              <a:buFont typeface="Arial" panose="020B0604020202020204" pitchFamily="34" charset="0"/>
-              <a:buChar char="•"/>
-            </a:pPr>
-            <a:endParaRPr lang="en-US" sz="2000" dirty="0"/>
-          </a:p>
-          <a:p>
-            <a:pPr marL="285750" indent="-285750">
-              <a:buFont typeface="Arial" panose="020B0604020202020204" pitchFamily="34" charset="0"/>
-              <a:buChar char="•"/>
-            </a:pPr>
-            <a:r>
-              <a:rPr lang="en-US" sz="2000" dirty="0"/>
-              <a:t>If knocking out a gene is </a:t>
-            </a:r>
-            <a:r>
-              <a:rPr lang="en-US" sz="2000" b="1" dirty="0"/>
-              <a:t>stimulatory to cell proliferation</a:t>
-            </a:r>
-            <a:r>
-              <a:rPr lang="en-US" sz="2000" dirty="0"/>
-              <a:t> the relative abundance will increase and our output variable will be positive</a:t>
-            </a:r>
-          </a:p>
-          <a:p>
-            <a:pPr marL="285750" indent="-285750">
-              <a:buFont typeface="Arial" panose="020B0604020202020204" pitchFamily="34" charset="0"/>
-              <a:buChar char="•"/>
-            </a:pPr>
-            <a:r>
-              <a:rPr lang="en-US" sz="2000" dirty="0"/>
-              <a:t>If knocking out a gene is </a:t>
-            </a:r>
-            <a:r>
-              <a:rPr lang="en-US" sz="2000" b="1" dirty="0"/>
-              <a:t>inhibitory to cell proliferation</a:t>
-            </a:r>
-            <a:r>
-              <a:rPr lang="en-US" sz="2000" dirty="0"/>
-              <a:t> the relative abundance will decrease and our output variable will be negative </a:t>
-            </a:r>
-          </a:p>
-          <a:p>
-            <a:endParaRPr lang="en-US" dirty="0"/>
+            <a:r>
+              <a:rPr lang="en-US" dirty="0"/>
+              <a:t>A cell line’s dependency on a given gene/protein to some function, in this case proliferation, can be conceptualized by multi-route pathways, and depending on the genomic landscape (</a:t>
+            </a:r>
+            <a:r>
+              <a:rPr lang="en-US" dirty="0" err="1"/>
+              <a:t>mutatons</a:t>
+            </a:r>
+            <a:r>
+              <a:rPr lang="en-US" dirty="0"/>
+              <a:t>, methylation, </a:t>
+            </a:r>
+            <a:r>
+              <a:rPr lang="en-US" dirty="0" err="1"/>
+              <a:t>exression</a:t>
+            </a:r>
+            <a:r>
+              <a:rPr lang="en-US" dirty="0"/>
+              <a:t>, protein activation) certain genes may be more or less critical. </a:t>
+            </a:r>
           </a:p>
         </p:txBody>
       </p:sp>
@@ -654,9 +560,9 @@
           <a:bodyPr/>
           <a:lstStyle/>
           <a:p>
-            <a:fld id="{247A48C2-11B5-4DAD-BB56-1384709B8A91}" type="slidenum">
+            <a:fld id="{E02DDEC9-2749-4C81-8CBB-0323C4E5E7CE}" type="slidenum">
               <a:rPr lang="en-US" smtClean="0"/>
-              <a:t>3</a:t>
+              <a:t>2</a:t>
             </a:fld>
             <a:endParaRPr lang="en-US"/>
           </a:p>
@@ -665,7 +571,403 @@
     </p:spTree>
     <p:extLst>
       <p:ext uri="{BB962C8B-B14F-4D97-AF65-F5344CB8AC3E}">
-        <p14:creationId xmlns:p14="http://schemas.microsoft.com/office/powerpoint/2010/main" val="2815938794"/>
+        <p14:creationId xmlns:p14="http://schemas.microsoft.com/office/powerpoint/2010/main" val="538450373"/>
+      </p:ext>
+    </p:extLst>
+  </p:cSld>
+  <p:clrMapOvr>
+    <a:masterClrMapping/>
+  </p:clrMapOvr>
+</p:notes>
+</file>
+
+<file path=ppt/notesSlides/notesSlide10.xml><?xml version="1.0" encoding="utf-8"?>
+<p:notes xmlns:a="http://schemas.openxmlformats.org/drawingml/2006/main" xmlns:r="http://schemas.openxmlformats.org/officeDocument/2006/relationships" xmlns:p="http://schemas.openxmlformats.org/presentationml/2006/main">
+  <p:cSld>
+    <p:spTree>
+      <p:nvGrpSpPr>
+        <p:cNvPr id="1" name=""/>
+        <p:cNvGrpSpPr/>
+        <p:nvPr/>
+      </p:nvGrpSpPr>
+      <p:grpSpPr>
+        <a:xfrm>
+          <a:off x="0" y="0"/>
+          <a:ext cx="0" cy="0"/>
+          <a:chOff x="0" y="0"/>
+          <a:chExt cx="0" cy="0"/>
+        </a:xfrm>
+      </p:grpSpPr>
+      <p:sp>
+        <p:nvSpPr>
+          <p:cNvPr id="2" name="Slide Image Placeholder 1"/>
+          <p:cNvSpPr>
+            <a:spLocks noGrp="1" noRot="1" noChangeAspect="1"/>
+          </p:cNvSpPr>
+          <p:nvPr>
+            <p:ph type="sldImg"/>
+          </p:nvPr>
+        </p:nvSpPr>
+        <p:spPr/>
+      </p:sp>
+      <p:sp>
+        <p:nvSpPr>
+          <p:cNvPr id="3" name="Notes Placeholder 2"/>
+          <p:cNvSpPr>
+            <a:spLocks noGrp="1"/>
+          </p:cNvSpPr>
+          <p:nvPr>
+            <p:ph type="body" idx="1"/>
+          </p:nvPr>
+        </p:nvSpPr>
+        <p:spPr/>
+        <p:txBody>
+          <a:bodyPr/>
+          <a:lstStyle/>
+          <a:p>
+            <a:r>
+              <a:rPr lang="en-US" dirty="0"/>
+              <a:t>Almost all of the variance seems to be explained by gene KO, which at first worried me, however after more thought it makes sense. Almost all cell lines will share the majority of their genome and only on rare events diverge, even when they do, likely only slightly. </a:t>
+            </a:r>
+          </a:p>
+        </p:txBody>
+      </p:sp>
+      <p:sp>
+        <p:nvSpPr>
+          <p:cNvPr id="4" name="Slide Number Placeholder 3"/>
+          <p:cNvSpPr>
+            <a:spLocks noGrp="1"/>
+          </p:cNvSpPr>
+          <p:nvPr>
+            <p:ph type="sldNum" sz="quarter" idx="5"/>
+          </p:nvPr>
+        </p:nvSpPr>
+        <p:spPr/>
+        <p:txBody>
+          <a:bodyPr/>
+          <a:lstStyle/>
+          <a:p>
+            <a:fld id="{E02DDEC9-2749-4C81-8CBB-0323C4E5E7CE}" type="slidenum">
+              <a:rPr lang="en-US" smtClean="0"/>
+              <a:t>11</a:t>
+            </a:fld>
+            <a:endParaRPr lang="en-US"/>
+          </a:p>
+        </p:txBody>
+      </p:sp>
+    </p:spTree>
+    <p:extLst>
+      <p:ext uri="{BB962C8B-B14F-4D97-AF65-F5344CB8AC3E}">
+        <p14:creationId xmlns:p14="http://schemas.microsoft.com/office/powerpoint/2010/main" val="1274562137"/>
+      </p:ext>
+    </p:extLst>
+  </p:cSld>
+  <p:clrMapOvr>
+    <a:masterClrMapping/>
+  </p:clrMapOvr>
+</p:notes>
+</file>
+
+<file path=ppt/notesSlides/notesSlide11.xml><?xml version="1.0" encoding="utf-8"?>
+<p:notes xmlns:a="http://schemas.openxmlformats.org/drawingml/2006/main" xmlns:r="http://schemas.openxmlformats.org/officeDocument/2006/relationships" xmlns:p="http://schemas.openxmlformats.org/presentationml/2006/main">
+  <p:cSld>
+    <p:spTree>
+      <p:nvGrpSpPr>
+        <p:cNvPr id="1" name=""/>
+        <p:cNvGrpSpPr/>
+        <p:nvPr/>
+      </p:nvGrpSpPr>
+      <p:grpSpPr>
+        <a:xfrm>
+          <a:off x="0" y="0"/>
+          <a:ext cx="0" cy="0"/>
+          <a:chOff x="0" y="0"/>
+          <a:chExt cx="0" cy="0"/>
+        </a:xfrm>
+      </p:grpSpPr>
+      <p:sp>
+        <p:nvSpPr>
+          <p:cNvPr id="2" name="Slide Image Placeholder 1"/>
+          <p:cNvSpPr>
+            <a:spLocks noGrp="1" noRot="1" noChangeAspect="1"/>
+          </p:cNvSpPr>
+          <p:nvPr>
+            <p:ph type="sldImg"/>
+          </p:nvPr>
+        </p:nvSpPr>
+        <p:spPr/>
+      </p:sp>
+      <p:sp>
+        <p:nvSpPr>
+          <p:cNvPr id="3" name="Notes Placeholder 2"/>
+          <p:cNvSpPr>
+            <a:spLocks noGrp="1"/>
+          </p:cNvSpPr>
+          <p:nvPr>
+            <p:ph type="body" idx="1"/>
+          </p:nvPr>
+        </p:nvSpPr>
+        <p:spPr/>
+        <p:txBody>
+          <a:bodyPr/>
+          <a:lstStyle/>
+          <a:p>
+            <a:r>
+              <a:rPr lang="en-US" dirty="0"/>
+              <a:t>To further explore how KO vs genome importance to gene dependency, I plotted a subset of cell lines and gene KOs. As we see (left) almost all of the variance is explained by the gene knockout, although there is some slight impact by genomic features (vertical striations). </a:t>
+            </a:r>
+          </a:p>
+          <a:p>
+            <a:endParaRPr lang="en-US" dirty="0"/>
+          </a:p>
+          <a:p>
+            <a:r>
+              <a:rPr lang="en-US" dirty="0"/>
+              <a:t>For the majority of therapeutic relevance, we need genome selectivity, thus we need to explore the genomic variance. In thinking through different ways to show this, I came up with the plot (right) showing two cell lines and the correlation of gene dependency between them. If all the values lie along the diagonal (or along any linear line) then there will be NO variation due to genome. However, gene dependency predictions that lie off that line will be indicative of cell line specific and differential response. In this plot between lines 34 &amp; 44, gene KO of NCBP1 leads to much reduced proliferation in line 44 then it does it line 25. This may be a method of finding targetable gene with sensitivity in certain genomes. </a:t>
+            </a:r>
+          </a:p>
+        </p:txBody>
+      </p:sp>
+      <p:sp>
+        <p:nvSpPr>
+          <p:cNvPr id="4" name="Slide Number Placeholder 3"/>
+          <p:cNvSpPr>
+            <a:spLocks noGrp="1"/>
+          </p:cNvSpPr>
+          <p:nvPr>
+            <p:ph type="sldNum" sz="quarter" idx="5"/>
+          </p:nvPr>
+        </p:nvSpPr>
+        <p:spPr/>
+        <p:txBody>
+          <a:bodyPr/>
+          <a:lstStyle/>
+          <a:p>
+            <a:fld id="{E02DDEC9-2749-4C81-8CBB-0323C4E5E7CE}" type="slidenum">
+              <a:rPr lang="en-US" smtClean="0"/>
+              <a:t>12</a:t>
+            </a:fld>
+            <a:endParaRPr lang="en-US"/>
+          </a:p>
+        </p:txBody>
+      </p:sp>
+    </p:spTree>
+    <p:extLst>
+      <p:ext uri="{BB962C8B-B14F-4D97-AF65-F5344CB8AC3E}">
+        <p14:creationId xmlns:p14="http://schemas.microsoft.com/office/powerpoint/2010/main" val="3509700894"/>
+      </p:ext>
+    </p:extLst>
+  </p:cSld>
+  <p:clrMapOvr>
+    <a:masterClrMapping/>
+  </p:clrMapOvr>
+</p:notes>
+</file>
+
+<file path=ppt/notesSlides/notesSlide12.xml><?xml version="1.0" encoding="utf-8"?>
+<p:notes xmlns:a="http://schemas.openxmlformats.org/drawingml/2006/main" xmlns:r="http://schemas.openxmlformats.org/officeDocument/2006/relationships" xmlns:p="http://schemas.openxmlformats.org/presentationml/2006/main">
+  <p:cSld>
+    <p:spTree>
+      <p:nvGrpSpPr>
+        <p:cNvPr id="1" name=""/>
+        <p:cNvGrpSpPr/>
+        <p:nvPr/>
+      </p:nvGrpSpPr>
+      <p:grpSpPr>
+        <a:xfrm>
+          <a:off x="0" y="0"/>
+          <a:ext cx="0" cy="0"/>
+          <a:chOff x="0" y="0"/>
+          <a:chExt cx="0" cy="0"/>
+        </a:xfrm>
+      </p:grpSpPr>
+      <p:sp>
+        <p:nvSpPr>
+          <p:cNvPr id="2" name="Slide Image Placeholder 1"/>
+          <p:cNvSpPr>
+            <a:spLocks noGrp="1" noRot="1" noChangeAspect="1"/>
+          </p:cNvSpPr>
+          <p:nvPr>
+            <p:ph type="sldImg"/>
+          </p:nvPr>
+        </p:nvSpPr>
+        <p:spPr/>
+      </p:sp>
+      <p:sp>
+        <p:nvSpPr>
+          <p:cNvPr id="3" name="Notes Placeholder 2"/>
+          <p:cNvSpPr>
+            <a:spLocks noGrp="1"/>
+          </p:cNvSpPr>
+          <p:nvPr>
+            <p:ph type="body" idx="1"/>
+          </p:nvPr>
+        </p:nvSpPr>
+        <p:spPr/>
+        <p:txBody>
+          <a:bodyPr/>
+          <a:lstStyle/>
+          <a:p>
+            <a:r>
+              <a:rPr lang="en-US" dirty="0"/>
+              <a:t>To walk through how this model can be applied and interpreted… </a:t>
+            </a:r>
+          </a:p>
+          <a:p>
+            <a:endParaRPr lang="en-US" dirty="0"/>
+          </a:p>
+          <a:p>
+            <a:r>
+              <a:rPr lang="en-US" dirty="0"/>
+              <a:t>We predict the gene dependency of POL2RL versus no KO. The plot (upper right) shows that POL2RL KO leads to significantly decreased proliferation (this distribution is for all 1200 CCLE cell lines we have access to). </a:t>
+            </a:r>
+          </a:p>
+          <a:p>
+            <a:endParaRPr lang="en-US" dirty="0"/>
+          </a:p>
+          <a:p>
+            <a:r>
+              <a:rPr lang="en-US" dirty="0"/>
+              <a:t>We can then ask questions like, what does the model think the pathway activations for this look like? Extracting the pathway latent space for all 1200 </a:t>
+            </a:r>
+            <a:r>
+              <a:rPr lang="en-US" dirty="0" err="1"/>
+              <a:t>ccle</a:t>
+            </a:r>
+            <a:r>
+              <a:rPr lang="en-US" dirty="0"/>
+              <a:t> cell lines for either normal or POL2RL KO shows that most pathways are comparable, however, “fibroblast growth factor receptor signaling pathway” is significantly reduced in the POL2RL KO. </a:t>
+            </a:r>
+          </a:p>
+          <a:p>
+            <a:endParaRPr lang="en-US" dirty="0"/>
+          </a:p>
+          <a:p>
+            <a:r>
+              <a:rPr lang="en-US" dirty="0"/>
+              <a:t>I recognize that this is likely not true pathway activation, rather, activation relevant to our prediction task. It would be interesting to think about validation techniques for KO -&gt; pathway activation. </a:t>
+            </a:r>
+          </a:p>
+        </p:txBody>
+      </p:sp>
+      <p:sp>
+        <p:nvSpPr>
+          <p:cNvPr id="4" name="Slide Number Placeholder 3"/>
+          <p:cNvSpPr>
+            <a:spLocks noGrp="1"/>
+          </p:cNvSpPr>
+          <p:nvPr>
+            <p:ph type="sldNum" sz="quarter" idx="5"/>
+          </p:nvPr>
+        </p:nvSpPr>
+        <p:spPr/>
+        <p:txBody>
+          <a:bodyPr/>
+          <a:lstStyle/>
+          <a:p>
+            <a:fld id="{E02DDEC9-2749-4C81-8CBB-0323C4E5E7CE}" type="slidenum">
+              <a:rPr lang="en-US" smtClean="0"/>
+              <a:t>13</a:t>
+            </a:fld>
+            <a:endParaRPr lang="en-US"/>
+          </a:p>
+        </p:txBody>
+      </p:sp>
+    </p:spTree>
+    <p:extLst>
+      <p:ext uri="{BB962C8B-B14F-4D97-AF65-F5344CB8AC3E}">
+        <p14:creationId xmlns:p14="http://schemas.microsoft.com/office/powerpoint/2010/main" val="1386872120"/>
+      </p:ext>
+    </p:extLst>
+  </p:cSld>
+  <p:clrMapOvr>
+    <a:masterClrMapping/>
+  </p:clrMapOvr>
+</p:notes>
+</file>
+
+<file path=ppt/notesSlides/notesSlide13.xml><?xml version="1.0" encoding="utf-8"?>
+<p:notes xmlns:a="http://schemas.openxmlformats.org/drawingml/2006/main" xmlns:r="http://schemas.openxmlformats.org/officeDocument/2006/relationships" xmlns:p="http://schemas.openxmlformats.org/presentationml/2006/main">
+  <p:cSld>
+    <p:spTree>
+      <p:nvGrpSpPr>
+        <p:cNvPr id="1" name=""/>
+        <p:cNvGrpSpPr/>
+        <p:nvPr/>
+      </p:nvGrpSpPr>
+      <p:grpSpPr>
+        <a:xfrm>
+          <a:off x="0" y="0"/>
+          <a:ext cx="0" cy="0"/>
+          <a:chOff x="0" y="0"/>
+          <a:chExt cx="0" cy="0"/>
+        </a:xfrm>
+      </p:grpSpPr>
+      <p:sp>
+        <p:nvSpPr>
+          <p:cNvPr id="2" name="Slide Image Placeholder 1"/>
+          <p:cNvSpPr>
+            <a:spLocks noGrp="1" noRot="1" noChangeAspect="1"/>
+          </p:cNvSpPr>
+          <p:nvPr>
+            <p:ph type="sldImg"/>
+          </p:nvPr>
+        </p:nvSpPr>
+        <p:spPr/>
+      </p:sp>
+      <p:sp>
+        <p:nvSpPr>
+          <p:cNvPr id="3" name="Notes Placeholder 2"/>
+          <p:cNvSpPr>
+            <a:spLocks noGrp="1"/>
+          </p:cNvSpPr>
+          <p:nvPr>
+            <p:ph type="body" idx="1"/>
+          </p:nvPr>
+        </p:nvSpPr>
+        <p:spPr/>
+        <p:txBody>
+          <a:bodyPr/>
+          <a:lstStyle/>
+          <a:p>
+            <a:r>
+              <a:rPr lang="en-US" dirty="0"/>
+              <a:t>Other questions we can ask are, which genes are differentially activated (between POL2RL and normal)? Above is the same plot as before, where node size is mapped to self-edge weight, and edge color is edge weights, however, I’ve now overlaid the differential gene activation onto each node. For most genes, there is very little differential activation, however for a select few, there is significant difference. To explore the relevance to the “Fibroblast growth factor…” pathway, I’ve overlaid the pathway genes with a white circle. Many of our differentially activated genes are in the pathway, as we would expect from the last slide. </a:t>
+            </a:r>
+            <a:br>
+              <a:rPr lang="en-US" dirty="0"/>
+            </a:br>
+            <a:endParaRPr lang="en-US" dirty="0"/>
+          </a:p>
+        </p:txBody>
+      </p:sp>
+      <p:sp>
+        <p:nvSpPr>
+          <p:cNvPr id="4" name="Slide Number Placeholder 3"/>
+          <p:cNvSpPr>
+            <a:spLocks noGrp="1"/>
+          </p:cNvSpPr>
+          <p:nvPr>
+            <p:ph type="sldNum" sz="quarter" idx="5"/>
+          </p:nvPr>
+        </p:nvSpPr>
+        <p:spPr/>
+        <p:txBody>
+          <a:bodyPr/>
+          <a:lstStyle/>
+          <a:p>
+            <a:fld id="{E02DDEC9-2749-4C81-8CBB-0323C4E5E7CE}" type="slidenum">
+              <a:rPr lang="en-US" smtClean="0"/>
+              <a:t>14</a:t>
+            </a:fld>
+            <a:endParaRPr lang="en-US"/>
+          </a:p>
+        </p:txBody>
+      </p:sp>
+    </p:spTree>
+    <p:extLst>
+      <p:ext uri="{BB962C8B-B14F-4D97-AF65-F5344CB8AC3E}">
+        <p14:creationId xmlns:p14="http://schemas.microsoft.com/office/powerpoint/2010/main" val="1171391458"/>
       </p:ext>
     </p:extLst>
   </p:cSld>
@@ -719,84 +1021,116 @@
           <a:bodyPr/>
           <a:lstStyle/>
           <a:p>
-            <a:r>
-              <a:rPr lang="en-US" dirty="0"/>
-              <a:t>Using Gene Ontology pathways: </a:t>
-            </a:r>
-          </a:p>
-          <a:p>
-            <a:r>
-              <a:rPr lang="en-US" dirty="0"/>
-              <a:t>	GO:0000165 – MAPK cascade:  199 Genes involved (that overlapped in CCLE) </a:t>
-            </a:r>
-          </a:p>
-          <a:p>
-            <a:endParaRPr lang="en-US" dirty="0"/>
-          </a:p>
-          <a:p>
-            <a:r>
-              <a:rPr lang="en-US" dirty="0"/>
-              <a:t>Using 199 genes:</a:t>
-            </a:r>
-          </a:p>
-          <a:p>
-            <a:pPr marL="342900" indent="-342900">
-              <a:buAutoNum type="arabicPeriod"/>
+            <a:pPr marL="285750" indent="-285750">
+              <a:buFont typeface="Arial" panose="020B0604020202020204" pitchFamily="34" charset="0"/>
+              <a:buChar char="•"/>
             </a:pPr>
             <a:r>
-              <a:rPr lang="en-US" dirty="0"/>
-              <a:t>find all other pathways that they’re involved in</a:t>
-            </a:r>
-          </a:p>
-          <a:p>
-            <a:pPr marL="342900" indent="-342900">
-              <a:buAutoNum type="arabicPeriod"/>
+              <a:rPr lang="en-US" sz="2000" dirty="0"/>
+              <a:t>Produce ~5 shRNA per protein coding gene</a:t>
+            </a:r>
+          </a:p>
+          <a:p>
+            <a:pPr marL="285750" indent="-285750">
+              <a:buFont typeface="Arial" panose="020B0604020202020204" pitchFamily="34" charset="0"/>
+              <a:buChar char="•"/>
             </a:pPr>
             <a:r>
-              <a:rPr lang="en-US" dirty="0"/>
-              <a:t>Count number of MAPK cascade genes in each pathway </a:t>
-            </a:r>
-          </a:p>
-          <a:p>
-            <a:pPr marL="342900" indent="-342900">
-              <a:buAutoNum type="arabicPeriod"/>
+              <a:rPr lang="en-US" sz="2000" dirty="0"/>
+              <a:t>In a given cell-line in-vitro: </a:t>
+            </a:r>
+          </a:p>
+          <a:p>
+            <a:pPr marL="742950" lvl="1" indent="-285750">
+              <a:buFont typeface="Arial" panose="020B0604020202020204" pitchFamily="34" charset="0"/>
+              <a:buChar char="•"/>
             </a:pPr>
             <a:r>
-              <a:rPr lang="en-US" dirty="0"/>
-              <a:t>Filter to overlapping pathways with &gt; 30 genes from MAPK cascade</a:t>
-            </a:r>
-          </a:p>
-          <a:p>
-            <a:pPr marL="342900" indent="-342900">
-              <a:buAutoNum type="arabicPeriod"/>
+              <a:rPr lang="en-US" sz="2000" dirty="0"/>
+              <a:t>Transfect shRNA(s) with multiplicity of ~0.3 </a:t>
+            </a:r>
+          </a:p>
+          <a:p>
+            <a:pPr marL="742950" lvl="1" indent="-285750">
+              <a:buFont typeface="Arial" panose="020B0604020202020204" pitchFamily="34" charset="0"/>
+              <a:buChar char="•"/>
             </a:pPr>
             <a:r>
-              <a:rPr lang="en-US" dirty="0"/>
-              <a:t>Remove any excessively large pathways (&gt; 600)</a:t>
-            </a:r>
-          </a:p>
-          <a:p>
-            <a:pPr marL="342900" indent="-342900">
-              <a:buAutoNum type="arabicPeriod"/>
+              <a:rPr lang="en-US" sz="2000" dirty="0"/>
+              <a:t>Culture cells for period of time (~16 doublings) </a:t>
+            </a:r>
+          </a:p>
+          <a:p>
+            <a:pPr marL="742950" lvl="1" indent="-285750">
+              <a:buFont typeface="Arial" panose="020B0604020202020204" pitchFamily="34" charset="0"/>
+              <a:buChar char="•"/>
             </a:pPr>
-            <a:endParaRPr lang="en-US" dirty="0"/>
-          </a:p>
-          <a:p>
-            <a:r>
-              <a:rPr lang="en-US" dirty="0"/>
-              <a:t>Leaves us with </a:t>
-            </a:r>
-            <a:r>
-              <a:rPr lang="en-US" b="1" dirty="0"/>
-              <a:t>27 GO biological processes </a:t>
-            </a:r>
-            <a:r>
-              <a:rPr lang="en-US" dirty="0"/>
-              <a:t>(pathways) and </a:t>
-            </a:r>
-            <a:r>
-              <a:rPr lang="en-US" b="1" dirty="0"/>
-              <a:t>1076 Genes </a:t>
+            <a:r>
+              <a:rPr lang="en-US" sz="2000" dirty="0"/>
+              <a:t>Isolate the shRNA sequences by PCR amplification </a:t>
+            </a:r>
+          </a:p>
+          <a:p>
+            <a:pPr marL="742950" lvl="1" indent="-285750">
+              <a:buFont typeface="Arial" panose="020B0604020202020204" pitchFamily="34" charset="0"/>
+              <a:buChar char="•"/>
+            </a:pPr>
+            <a:r>
+              <a:rPr lang="en-US" sz="2000" dirty="0"/>
+              <a:t>Measure relative abundance of each shRNA </a:t>
+            </a:r>
+          </a:p>
+          <a:p>
+            <a:pPr marL="742950" lvl="1" indent="-285750">
+              <a:buFont typeface="Arial" panose="020B0604020202020204" pitchFamily="34" charset="0"/>
+              <a:buChar char="•"/>
+            </a:pPr>
+            <a:r>
+              <a:rPr lang="en-US" sz="2000" dirty="0"/>
+              <a:t>Output variable is log transformed relative abundance</a:t>
+            </a:r>
+          </a:p>
+          <a:p>
+            <a:pPr marL="285750" indent="-285750">
+              <a:buFont typeface="Arial" panose="020B0604020202020204" pitchFamily="34" charset="0"/>
+              <a:buChar char="•"/>
+            </a:pPr>
+            <a:endParaRPr lang="en-US" sz="2000" dirty="0"/>
+          </a:p>
+          <a:p>
+            <a:pPr marL="285750" indent="-285750">
+              <a:buFont typeface="Arial" panose="020B0604020202020204" pitchFamily="34" charset="0"/>
+              <a:buChar char="•"/>
+            </a:pPr>
+            <a:r>
+              <a:rPr lang="en-US" sz="2000" dirty="0"/>
+              <a:t>If knocking out a gene is </a:t>
+            </a:r>
+            <a:r>
+              <a:rPr lang="en-US" sz="2000" b="1" dirty="0"/>
+              <a:t>stimulatory to cell proliferation</a:t>
+            </a:r>
+            <a:r>
+              <a:rPr lang="en-US" sz="2000" dirty="0"/>
+              <a:t> the relative abundance will increase and our output variable will be positive</a:t>
+            </a:r>
+          </a:p>
+          <a:p>
+            <a:pPr marL="285750" indent="-285750">
+              <a:buFont typeface="Arial" panose="020B0604020202020204" pitchFamily="34" charset="0"/>
+              <a:buChar char="•"/>
+            </a:pPr>
+            <a:r>
+              <a:rPr lang="en-US" sz="2000" dirty="0"/>
+              <a:t>If knocking out a gene is </a:t>
+            </a:r>
+            <a:r>
+              <a:rPr lang="en-US" sz="2000" b="1" dirty="0"/>
+              <a:t>inhibitory to cell proliferation</a:t>
+            </a:r>
+            <a:r>
+              <a:rPr lang="en-US" sz="2000" dirty="0"/>
+              <a:t> the relative abundance will decrease and our output variable will be negative </a:t>
             </a:r>
           </a:p>
           <a:p>
@@ -819,9 +1153,9 @@
           <a:bodyPr/>
           <a:lstStyle/>
           <a:p>
-            <a:fld id="{E02DDEC9-2749-4C81-8CBB-0323C4E5E7CE}" type="slidenum">
+            <a:fld id="{247A48C2-11B5-4DAD-BB56-1384709B8A91}" type="slidenum">
               <a:rPr lang="en-US" smtClean="0"/>
-              <a:t>6</a:t>
+              <a:t>3</a:t>
             </a:fld>
             <a:endParaRPr lang="en-US"/>
           </a:p>
@@ -830,7 +1164,7 @@
     </p:spTree>
     <p:extLst>
       <p:ext uri="{BB962C8B-B14F-4D97-AF65-F5344CB8AC3E}">
-        <p14:creationId xmlns:p14="http://schemas.microsoft.com/office/powerpoint/2010/main" val="209533924"/>
+        <p14:creationId xmlns:p14="http://schemas.microsoft.com/office/powerpoint/2010/main" val="2815938794"/>
       </p:ext>
     </p:extLst>
   </p:cSld>
@@ -886,7 +1220,7 @@
           <a:p>
             <a:r>
               <a:rPr lang="en-US" dirty="0"/>
-              <a:t>Trained for 100+ sub-epochs [100,000/500,000] on tesla P4000 [8GB mem] + 8 cores [64GB mem], which took 1-2 days. Training took approximately 4ms / observation, and to fit into memory I used batches of 10. </a:t>
+              <a:t>GCNs were inspired by convolutional networks in image processing, which uses spatial structure in images (or other spatially organized data types) to learn feature extractions (analogous to our aggregation function), which can be applied over the entire matrix. </a:t>
             </a:r>
           </a:p>
           <a:p>
@@ -895,15 +1229,16 @@
           <a:p>
             <a:r>
               <a:rPr lang="en-US" dirty="0"/>
-              <a:t>Used the Ranger Optimizer (combination of Lookahead [1] and </a:t>
-            </a:r>
-            <a:r>
-              <a:rPr lang="en-US" dirty="0" err="1"/>
-              <a:t>RAdam</a:t>
-            </a:r>
+              <a:t>Similarly, GCNs are used to take advantage of the structural information encoded in a graph to extract relevant features. For instance, does a gene’s neighbors have low expression? A mutation? A distinct expression profile (classic GCN may not be able to measure this – but graph attention networks might)?</a:t>
+            </a:r>
+          </a:p>
+          <a:p>
+            <a:endParaRPr lang="en-US" dirty="0"/>
+          </a:p>
+          <a:p>
             <a:r>
               <a:rPr lang="en-US" dirty="0"/>
-              <a:t> [2]) along with the mish [3] activation function. </a:t>
+              <a:t>As in many PGMs and graph oriented algorithms, we’re implementing a message passing algorithm, however, the novelty comes from learning the aggregation function (or feature extraction function). </a:t>
             </a:r>
           </a:p>
           <a:p>
@@ -912,160 +1247,8 @@
           <a:p>
             <a:r>
               <a:rPr lang="en-US" dirty="0"/>
-              <a:t>I was still seeing training improvement, however, since I was paying for compute time I decided to cut off training early. If I was to train longer I would like to implement a cosine annealing learning rate scheduler [4]. </a:t>
-            </a:r>
-          </a:p>
-          <a:p>
-            <a:endParaRPr lang="en-US" dirty="0"/>
-          </a:p>
-          <a:p>
-            <a:r>
-              <a:rPr lang="en-US" dirty="0"/>
-              <a:t>In retrospect, I regret training a regression rather than making this a classification problem. I think it would have trained better and been more interpretable. </a:t>
-            </a:r>
-          </a:p>
-          <a:p>
-            <a:endParaRPr lang="en-US" dirty="0"/>
-          </a:p>
-          <a:p>
-            <a:endParaRPr lang="en-US" dirty="0"/>
-          </a:p>
-          <a:p>
-            <a:endParaRPr lang="en-US" dirty="0"/>
-          </a:p>
-          <a:p>
-            <a:r>
-              <a:rPr lang="en-US" dirty="0">
-                <a:effectLst/>
-              </a:rPr>
-              <a:t>1. Zhang MR, Lucas J, Hinton G, Ba J. Lookahead Optimizer: k steps forward, 1 step back. arXiv:190708610 [cs, stat] [Internet]. 2019 Dec 3 [cited 2020 Mar 14]; Available from: </a:t>
-            </a:r>
-            <a:r>
-              <a:rPr lang="en-US" dirty="0">
-                <a:effectLst/>
-                <a:hlinkClick r:id="rId3"/>
-              </a:rPr>
-              <a:t>http://arxiv.org/abs/1907.08610</a:t>
-            </a:r>
-            <a:endParaRPr lang="en-US" dirty="0">
-              <a:effectLst/>
-            </a:endParaRPr>
-          </a:p>
-          <a:p>
-            <a:endParaRPr lang="en-US" dirty="0"/>
-          </a:p>
-          <a:p>
-            <a:r>
-              <a:rPr lang="en-US" dirty="0">
-                <a:effectLst/>
-              </a:rPr>
-              <a:t>2. Liu L, Jiang H, He P, Chen W, Liu X, Gao J, et al. On the Variance of the Adaptive Learning Rate and Beyond. arXiv:190803265 [cs, stat] [Internet]. 2020 Mar 9 [cited 2020 Mar 14]; Available from: </a:t>
-            </a:r>
-            <a:r>
-              <a:rPr lang="en-US" dirty="0">
-                <a:effectLst/>
-                <a:hlinkClick r:id="rId4"/>
-              </a:rPr>
-              <a:t>http://arxiv.org/abs/1908.03265</a:t>
-            </a:r>
-            <a:endParaRPr lang="en-US" dirty="0">
-              <a:effectLst/>
-            </a:endParaRPr>
-          </a:p>
-          <a:p>
-            <a:endParaRPr lang="en-US" dirty="0">
-              <a:effectLst/>
-            </a:endParaRPr>
-          </a:p>
-          <a:p>
-            <a:r>
-              <a:rPr lang="en-US" dirty="0">
-                <a:effectLst/>
-              </a:rPr>
-              <a:t>3. </a:t>
-            </a:r>
-            <a:r>
-              <a:rPr lang="en-US" dirty="0" err="1">
-                <a:effectLst/>
-              </a:rPr>
-              <a:t>Misra</a:t>
-            </a:r>
-            <a:r>
-              <a:rPr lang="en-US" dirty="0">
-                <a:effectLst/>
-              </a:rPr>
-              <a:t> D. Mish: A Self Regularized Non-Monotonic Neural Activation Function. arXiv:190808681 [cs, stat] [Internet]. 2019 Oct 2 [cited 2020 Mar 14]; Available from: </a:t>
-            </a:r>
-            <a:r>
-              <a:rPr lang="en-US" dirty="0">
-                <a:effectLst/>
-                <a:hlinkClick r:id="rId5"/>
-              </a:rPr>
-              <a:t>http://arxiv.org/abs/1908.08681</a:t>
-            </a:r>
-            <a:endParaRPr lang="en-US" dirty="0">
-              <a:effectLst/>
-            </a:endParaRPr>
-          </a:p>
-          <a:p>
-            <a:endParaRPr lang="en-US" dirty="0">
-              <a:effectLst/>
-            </a:endParaRPr>
-          </a:p>
-          <a:p>
-            <a:r>
-              <a:rPr lang="en-US" dirty="0">
-                <a:effectLst/>
-              </a:rPr>
-              <a:t>4. </a:t>
-            </a:r>
-            <a:r>
-              <a:rPr lang="en-US" dirty="0" err="1">
-                <a:effectLst/>
-              </a:rPr>
-              <a:t>Loshchilov</a:t>
-            </a:r>
-            <a:r>
-              <a:rPr lang="en-US" dirty="0">
-                <a:effectLst/>
-              </a:rPr>
-              <a:t> I, </a:t>
-            </a:r>
-            <a:r>
-              <a:rPr lang="en-US" dirty="0" err="1">
-                <a:effectLst/>
-              </a:rPr>
-              <a:t>Hutter</a:t>
-            </a:r>
-            <a:r>
-              <a:rPr lang="en-US" dirty="0">
-                <a:effectLst/>
-              </a:rPr>
-              <a:t> F. SGDR: Stochastic Gradient Descent with Warm Restarts. arXiv:160803983 [cs, math] [Internet]. 2017 May 3 [cited 2020 Mar 14]; Available from: </a:t>
-            </a:r>
-            <a:r>
-              <a:rPr lang="en-US" dirty="0">
-                <a:effectLst/>
-                <a:hlinkClick r:id="rId6"/>
-              </a:rPr>
-              <a:t>http://arxiv.org/abs/1608.03983</a:t>
-            </a:r>
-            <a:endParaRPr lang="en-US" dirty="0">
-              <a:effectLst/>
-            </a:endParaRPr>
-          </a:p>
-          <a:p>
-            <a:endParaRPr lang="en-US" dirty="0">
-              <a:effectLst/>
-            </a:endParaRPr>
-          </a:p>
-          <a:p>
-            <a:endParaRPr lang="en-US" dirty="0">
-              <a:effectLst/>
-            </a:endParaRPr>
-          </a:p>
-          <a:p>
-            <a:endParaRPr lang="en-US" dirty="0"/>
+              <a:t>Spatial GCNs operate directly on the adjacency matrix and thus can be applied to novel graph structures and is considered inductive learning. Spectral GCNs operate on the eigenvectors of the graph Laplacian, and are relevant only to the graph structure it was trained on; The advantage of spectral methods are that once in the Fourier space, they can be implemented similarly to classical CNNs. </a:t>
+            </a:r>
           </a:p>
         </p:txBody>
       </p:sp>
@@ -1086,6 +1269,771 @@
           <a:p>
             <a:fld id="{E02DDEC9-2749-4C81-8CBB-0323C4E5E7CE}" type="slidenum">
               <a:rPr lang="en-US" smtClean="0"/>
+              <a:t>4</a:t>
+            </a:fld>
+            <a:endParaRPr lang="en-US"/>
+          </a:p>
+        </p:txBody>
+      </p:sp>
+    </p:spTree>
+    <p:extLst>
+      <p:ext uri="{BB962C8B-B14F-4D97-AF65-F5344CB8AC3E}">
+        <p14:creationId xmlns:p14="http://schemas.microsoft.com/office/powerpoint/2010/main" val="865071389"/>
+      </p:ext>
+    </p:extLst>
+  </p:cSld>
+  <p:clrMapOvr>
+    <a:masterClrMapping/>
+  </p:clrMapOvr>
+</p:notes>
+</file>
+
+<file path=ppt/notesSlides/notesSlide4.xml><?xml version="1.0" encoding="utf-8"?>
+<p:notes xmlns:a="http://schemas.openxmlformats.org/drawingml/2006/main" xmlns:r="http://schemas.openxmlformats.org/officeDocument/2006/relationships" xmlns:p="http://schemas.openxmlformats.org/presentationml/2006/main">
+  <p:cSld>
+    <p:spTree>
+      <p:nvGrpSpPr>
+        <p:cNvPr id="1" name=""/>
+        <p:cNvGrpSpPr/>
+        <p:nvPr/>
+      </p:nvGrpSpPr>
+      <p:grpSpPr>
+        <a:xfrm>
+          <a:off x="0" y="0"/>
+          <a:ext cx="0" cy="0"/>
+          <a:chOff x="0" y="0"/>
+          <a:chExt cx="0" cy="0"/>
+        </a:xfrm>
+      </p:grpSpPr>
+      <p:sp>
+        <p:nvSpPr>
+          <p:cNvPr id="2" name="Slide Image Placeholder 1"/>
+          <p:cNvSpPr>
+            <a:spLocks noGrp="1" noRot="1" noChangeAspect="1"/>
+          </p:cNvSpPr>
+          <p:nvPr>
+            <p:ph type="sldImg"/>
+          </p:nvPr>
+        </p:nvSpPr>
+        <p:spPr/>
+      </p:sp>
+      <p:sp>
+        <p:nvSpPr>
+          <p:cNvPr id="3" name="Notes Placeholder 2"/>
+          <p:cNvSpPr>
+            <a:spLocks noGrp="1"/>
+          </p:cNvSpPr>
+          <p:nvPr>
+            <p:ph type="body" idx="1"/>
+          </p:nvPr>
+        </p:nvSpPr>
+        <p:spPr/>
+        <p:txBody>
+          <a:bodyPr/>
+          <a:lstStyle/>
+          <a:p>
+            <a:r>
+              <a:rPr lang="en-US" dirty="0"/>
+              <a:t>Gene features are fairly straight forward to encode as a vector of features, organized in the same order as the adjacency matrix. The Gene Knockout is slightly more difficult. One naïve method would be to include a feature, perhaps a binary feature, on the gene itself; This would be an exceedingly sparse feature vector and unlikely to have good performance. Moreover, the biological relevance of a gene knockout lends itself to encoding as changes in graph topology. For instance, if Gene A is KO, then it cannot interact with it’s neighbors and can be encoded by removing the edges between A and it’s neighbors. Since we’re using a spatial GCN, novel graph topologies are all equally applicable. </a:t>
+            </a:r>
+          </a:p>
+          <a:p>
+            <a:endParaRPr lang="en-US" dirty="0"/>
+          </a:p>
+          <a:p>
+            <a:pPr marL="0" marR="0" lvl="0" indent="0" algn="l" defTabSz="914400" rtl="0" eaLnBrk="1" fontAlgn="auto" latinLnBrk="0" hangingPunct="1">
+              <a:lnSpc>
+                <a:spcPct val="100000"/>
+              </a:lnSpc>
+              <a:spcBef>
+                <a:spcPts val="0"/>
+              </a:spcBef>
+              <a:spcAft>
+                <a:spcPts val="0"/>
+              </a:spcAft>
+              <a:buClrTx/>
+              <a:buSzTx/>
+              <a:buFontTx/>
+              <a:buNone/>
+              <a:tabLst/>
+              <a:defRPr/>
+            </a:pPr>
+            <a:r>
+              <a:rPr lang="en-US" dirty="0"/>
+              <a:t>To implement a GCN, especially on large graphs, requires a linear algebra framework. The learned aggregation function is pictured above. One key point here is, for good performance, we must normalize the adjacency matrix by it’s degree matrix. Since we’re summing over the aggregation function of all neighbors then genes with many neighbors will have much higher values. The original GCN paper (</a:t>
+            </a:r>
+            <a:r>
+              <a:rPr lang="en-US" sz="1200" b="0" dirty="0"/>
+              <a:t>SEMI-SUPERVISED CLASSIFICATION WITH GRAPH CONVOLUTIONAL NETWORKS (2017)) presents this renormalization trick (see above), which has the advantage of not only normalizing by degree but also by the neighbors degree; Which can be thought of as something analogous to a centrality normalization. </a:t>
+            </a:r>
+          </a:p>
+          <a:p>
+            <a:pPr marL="0" marR="0" lvl="0" indent="0" algn="l" defTabSz="914400" rtl="0" eaLnBrk="1" fontAlgn="auto" latinLnBrk="0" hangingPunct="1">
+              <a:lnSpc>
+                <a:spcPct val="100000"/>
+              </a:lnSpc>
+              <a:spcBef>
+                <a:spcPts val="0"/>
+              </a:spcBef>
+              <a:spcAft>
+                <a:spcPts val="0"/>
+              </a:spcAft>
+              <a:buClrTx/>
+              <a:buSzTx/>
+              <a:buFontTx/>
+              <a:buNone/>
+              <a:tabLst/>
+              <a:defRPr/>
+            </a:pPr>
+            <a:endParaRPr lang="en-US" sz="1200" b="0" dirty="0"/>
+          </a:p>
+          <a:p>
+            <a:pPr marL="0" marR="0" lvl="0" indent="0" algn="l" defTabSz="914400" rtl="0" eaLnBrk="1" fontAlgn="auto" latinLnBrk="0" hangingPunct="1">
+              <a:lnSpc>
+                <a:spcPct val="100000"/>
+              </a:lnSpc>
+              <a:spcBef>
+                <a:spcPts val="0"/>
+              </a:spcBef>
+              <a:spcAft>
+                <a:spcPts val="0"/>
+              </a:spcAft>
+              <a:buClrTx/>
+              <a:buSzTx/>
+              <a:buFontTx/>
+              <a:buNone/>
+              <a:tabLst/>
+              <a:defRPr/>
+            </a:pPr>
+            <a:r>
+              <a:rPr lang="en-US" sz="1200" b="0" dirty="0"/>
+              <a:t>Last, a novelty I’ve added is to learn a “coupling matrix”, that is, edge weights between nodes that limit how much information can pass along an edge. In drug response or signal transduction, the concept of coupling between genes is extremely important to cellular function, and similarly, learning these weights are an added source of interpretability and model flexibility. Implementation of this is done by element wise matrix multiplication of the adjacency matrix and the coupling matrix, or can be thought of as the coupling matrix masked by the adjacency matrix (since it’s 0/1). </a:t>
+            </a:r>
+          </a:p>
+        </p:txBody>
+      </p:sp>
+      <p:sp>
+        <p:nvSpPr>
+          <p:cNvPr id="4" name="Slide Number Placeholder 3"/>
+          <p:cNvSpPr>
+            <a:spLocks noGrp="1"/>
+          </p:cNvSpPr>
+          <p:nvPr>
+            <p:ph type="sldNum" sz="quarter" idx="5"/>
+          </p:nvPr>
+        </p:nvSpPr>
+        <p:spPr/>
+        <p:txBody>
+          <a:bodyPr/>
+          <a:lstStyle/>
+          <a:p>
+            <a:fld id="{E02DDEC9-2749-4C81-8CBB-0323C4E5E7CE}" type="slidenum">
+              <a:rPr lang="en-US" smtClean="0"/>
+              <a:t>5</a:t>
+            </a:fld>
+            <a:endParaRPr lang="en-US"/>
+          </a:p>
+        </p:txBody>
+      </p:sp>
+    </p:spTree>
+    <p:extLst>
+      <p:ext uri="{BB962C8B-B14F-4D97-AF65-F5344CB8AC3E}">
+        <p14:creationId xmlns:p14="http://schemas.microsoft.com/office/powerpoint/2010/main" val="2093955374"/>
+      </p:ext>
+    </p:extLst>
+  </p:cSld>
+  <p:clrMapOvr>
+    <a:masterClrMapping/>
+  </p:clrMapOvr>
+</p:notes>
+</file>
+
+<file path=ppt/notesSlides/notesSlide5.xml><?xml version="1.0" encoding="utf-8"?>
+<p:notes xmlns:a="http://schemas.openxmlformats.org/drawingml/2006/main" xmlns:r="http://schemas.openxmlformats.org/officeDocument/2006/relationships" xmlns:p="http://schemas.openxmlformats.org/presentationml/2006/main">
+  <p:cSld>
+    <p:spTree>
+      <p:nvGrpSpPr>
+        <p:cNvPr id="1" name=""/>
+        <p:cNvGrpSpPr/>
+        <p:nvPr/>
+      </p:nvGrpSpPr>
+      <p:grpSpPr>
+        <a:xfrm>
+          <a:off x="0" y="0"/>
+          <a:ext cx="0" cy="0"/>
+          <a:chOff x="0" y="0"/>
+          <a:chExt cx="0" cy="0"/>
+        </a:xfrm>
+      </p:grpSpPr>
+      <p:sp>
+        <p:nvSpPr>
+          <p:cNvPr id="2" name="Slide Image Placeholder 1"/>
+          <p:cNvSpPr>
+            <a:spLocks noGrp="1" noRot="1" noChangeAspect="1"/>
+          </p:cNvSpPr>
+          <p:nvPr>
+            <p:ph type="sldImg"/>
+          </p:nvPr>
+        </p:nvSpPr>
+        <p:spPr/>
+      </p:sp>
+      <p:sp>
+        <p:nvSpPr>
+          <p:cNvPr id="3" name="Notes Placeholder 2"/>
+          <p:cNvSpPr>
+            <a:spLocks noGrp="1"/>
+          </p:cNvSpPr>
+          <p:nvPr>
+            <p:ph type="body" idx="1"/>
+          </p:nvPr>
+        </p:nvSpPr>
+        <p:spPr/>
+        <p:txBody>
+          <a:bodyPr/>
+          <a:lstStyle/>
+          <a:p>
+            <a:r>
+              <a:rPr lang="en-US" dirty="0"/>
+              <a:t>To implement this model, I first attempted to use all available genes in the </a:t>
+            </a:r>
+            <a:r>
+              <a:rPr lang="en-US" dirty="0" err="1"/>
+              <a:t>Reactome</a:t>
+            </a:r>
+            <a:r>
+              <a:rPr lang="en-US" dirty="0"/>
+              <a:t> Functional Interaction network (~10k that overlapped with CCLE), however, this ran into memory issues when training (What do you mean I can’t allocate 250GB of memory?!). So to condense this I needed a smaller network, however, I wanted a set of genes that were locally connected, and functionally connected. To add a relevance to cancer biology, I chose to start with the MAPK cascade pathway (Gene Ontology pathway) which is involved in multiple cancer types and is targeted by drugs such as </a:t>
+            </a:r>
+            <a:r>
+              <a:rPr lang="en-US" dirty="0" err="1"/>
+              <a:t>Trematinib</a:t>
+            </a:r>
+            <a:r>
+              <a:rPr lang="en-US" dirty="0"/>
+              <a:t> (MAPK2/MAPK1). To make sure there was functional significance and pathway diversity (I’ll admit, part of this is so that I could implement the visible neural network) I searched for pathways that had a large number of genes from the MAPK cascade, then included those as well. The final network is approximately 1000 genes and made up of over 25 GO pathways. </a:t>
+            </a:r>
+          </a:p>
+          <a:p>
+            <a:endParaRPr lang="en-US" dirty="0"/>
+          </a:p>
+          <a:p>
+            <a:r>
+              <a:rPr lang="en-US" dirty="0"/>
+              <a:t>To reduce scope for this project, I binned all edge types from the FI network and made them undirected. Only the largest component was kept. </a:t>
+            </a:r>
+          </a:p>
+          <a:p>
+            <a:endParaRPr lang="en-US" dirty="0"/>
+          </a:p>
+          <a:p>
+            <a:r>
+              <a:rPr lang="en-US" dirty="0"/>
+              <a:t>Overview of process to generate network: </a:t>
+            </a:r>
+          </a:p>
+          <a:p>
+            <a:endParaRPr lang="en-US" dirty="0"/>
+          </a:p>
+          <a:p>
+            <a:r>
+              <a:rPr lang="en-US" dirty="0"/>
+              <a:t>Using Gene Ontology pathways: </a:t>
+            </a:r>
+          </a:p>
+          <a:p>
+            <a:r>
+              <a:rPr lang="en-US" dirty="0"/>
+              <a:t>	GO:0000165 – MAPK cascade:  199 Genes involved (that overlapped in CCLE) </a:t>
+            </a:r>
+          </a:p>
+          <a:p>
+            <a:endParaRPr lang="en-US" dirty="0"/>
+          </a:p>
+          <a:p>
+            <a:r>
+              <a:rPr lang="en-US" dirty="0"/>
+              <a:t>Using 199 genes:</a:t>
+            </a:r>
+          </a:p>
+          <a:p>
+            <a:pPr marL="342900" indent="-342900">
+              <a:buAutoNum type="arabicPeriod"/>
+            </a:pPr>
+            <a:r>
+              <a:rPr lang="en-US" dirty="0"/>
+              <a:t>find all other pathways that they’re involved in</a:t>
+            </a:r>
+          </a:p>
+          <a:p>
+            <a:pPr marL="342900" indent="-342900">
+              <a:buAutoNum type="arabicPeriod"/>
+            </a:pPr>
+            <a:r>
+              <a:rPr lang="en-US" dirty="0"/>
+              <a:t>Count number of MAPK cascade genes in each pathway </a:t>
+            </a:r>
+          </a:p>
+          <a:p>
+            <a:pPr marL="342900" indent="-342900">
+              <a:buAutoNum type="arabicPeriod"/>
+            </a:pPr>
+            <a:r>
+              <a:rPr lang="en-US" dirty="0"/>
+              <a:t>Filter to overlapping pathways with &gt; 30 genes from MAPK cascade</a:t>
+            </a:r>
+          </a:p>
+          <a:p>
+            <a:pPr marL="342900" indent="-342900">
+              <a:buAutoNum type="arabicPeriod"/>
+            </a:pPr>
+            <a:r>
+              <a:rPr lang="en-US" dirty="0"/>
+              <a:t>Remove any excessively large pathways (&gt; 600)</a:t>
+            </a:r>
+          </a:p>
+          <a:p>
+            <a:pPr marL="342900" indent="-342900">
+              <a:buAutoNum type="arabicPeriod"/>
+            </a:pPr>
+            <a:endParaRPr lang="en-US" dirty="0"/>
+          </a:p>
+          <a:p>
+            <a:r>
+              <a:rPr lang="en-US" dirty="0"/>
+              <a:t>Leaves us with </a:t>
+            </a:r>
+            <a:r>
+              <a:rPr lang="en-US" b="1" dirty="0"/>
+              <a:t>27 GO biological processes </a:t>
+            </a:r>
+            <a:r>
+              <a:rPr lang="en-US" dirty="0"/>
+              <a:t>(pathways) and </a:t>
+            </a:r>
+            <a:r>
+              <a:rPr lang="en-US" b="1" dirty="0"/>
+              <a:t>1076 Genes </a:t>
+            </a:r>
+          </a:p>
+          <a:p>
+            <a:endParaRPr lang="en-US" dirty="0"/>
+          </a:p>
+        </p:txBody>
+      </p:sp>
+      <p:sp>
+        <p:nvSpPr>
+          <p:cNvPr id="4" name="Slide Number Placeholder 3"/>
+          <p:cNvSpPr>
+            <a:spLocks noGrp="1"/>
+          </p:cNvSpPr>
+          <p:nvPr>
+            <p:ph type="sldNum" sz="quarter" idx="5"/>
+          </p:nvPr>
+        </p:nvSpPr>
+        <p:spPr/>
+        <p:txBody>
+          <a:bodyPr/>
+          <a:lstStyle/>
+          <a:p>
+            <a:fld id="{E02DDEC9-2749-4C81-8CBB-0323C4E5E7CE}" type="slidenum">
+              <a:rPr lang="en-US" smtClean="0"/>
+              <a:t>6</a:t>
+            </a:fld>
+            <a:endParaRPr lang="en-US"/>
+          </a:p>
+        </p:txBody>
+      </p:sp>
+    </p:spTree>
+    <p:extLst>
+      <p:ext uri="{BB962C8B-B14F-4D97-AF65-F5344CB8AC3E}">
+        <p14:creationId xmlns:p14="http://schemas.microsoft.com/office/powerpoint/2010/main" val="209533924"/>
+      </p:ext>
+    </p:extLst>
+  </p:cSld>
+  <p:clrMapOvr>
+    <a:masterClrMapping/>
+  </p:clrMapOvr>
+</p:notes>
+</file>
+
+<file path=ppt/notesSlides/notesSlide6.xml><?xml version="1.0" encoding="utf-8"?>
+<p:notes xmlns:a="http://schemas.openxmlformats.org/drawingml/2006/main" xmlns:r="http://schemas.openxmlformats.org/officeDocument/2006/relationships" xmlns:p="http://schemas.openxmlformats.org/presentationml/2006/main">
+  <p:cSld>
+    <p:spTree>
+      <p:nvGrpSpPr>
+        <p:cNvPr id="1" name=""/>
+        <p:cNvGrpSpPr/>
+        <p:nvPr/>
+      </p:nvGrpSpPr>
+      <p:grpSpPr>
+        <a:xfrm>
+          <a:off x="0" y="0"/>
+          <a:ext cx="0" cy="0"/>
+          <a:chOff x="0" y="0"/>
+          <a:chExt cx="0" cy="0"/>
+        </a:xfrm>
+      </p:grpSpPr>
+      <p:sp>
+        <p:nvSpPr>
+          <p:cNvPr id="2" name="Slide Image Placeholder 1"/>
+          <p:cNvSpPr>
+            <a:spLocks noGrp="1" noRot="1" noChangeAspect="1"/>
+          </p:cNvSpPr>
+          <p:nvPr>
+            <p:ph type="sldImg"/>
+          </p:nvPr>
+        </p:nvSpPr>
+        <p:spPr/>
+      </p:sp>
+      <p:sp>
+        <p:nvSpPr>
+          <p:cNvPr id="3" name="Notes Placeholder 2"/>
+          <p:cNvSpPr>
+            <a:spLocks noGrp="1"/>
+          </p:cNvSpPr>
+          <p:nvPr>
+            <p:ph type="body" idx="1"/>
+          </p:nvPr>
+        </p:nvSpPr>
+        <p:spPr/>
+        <p:txBody>
+          <a:bodyPr/>
+          <a:lstStyle/>
+          <a:p>
+            <a:r>
+              <a:rPr lang="en-US" dirty="0"/>
+              <a:t>The overall model architecture of </a:t>
+            </a:r>
+            <a:r>
+              <a:rPr lang="en-US" i="1" dirty="0" err="1"/>
+              <a:t>TrojanArrow</a:t>
+            </a:r>
+            <a:r>
+              <a:rPr lang="en-US" i="0" dirty="0"/>
+              <a:t>. The first four layers are a GCN, allowing information to pass between genes, and relevant features to be extracted. The </a:t>
+            </a:r>
+            <a:r>
+              <a:rPr lang="en-US" b="1" i="0" dirty="0"/>
+              <a:t>gene activations </a:t>
+            </a:r>
+            <a:r>
+              <a:rPr lang="en-US" b="0" i="0" dirty="0"/>
+              <a:t>are then mapped back to a single dimension to add interpretability (and simplicity) – this is the gene activation latent space that we will look at later on. Note, this does NOT indicate protein activation, rather, it’s activations relevant to the prediction task. </a:t>
+            </a:r>
+          </a:p>
+          <a:p>
+            <a:endParaRPr lang="en-US" b="0" i="0" dirty="0"/>
+          </a:p>
+          <a:p>
+            <a:r>
+              <a:rPr lang="en-US" b="0" i="0" dirty="0"/>
+              <a:t>Next, using the GO pathway membership, gene activations are mapped to a </a:t>
+            </a:r>
+            <a:r>
+              <a:rPr lang="en-US" b="1" i="0" dirty="0"/>
+              <a:t>pathway activation</a:t>
+            </a:r>
+            <a:r>
+              <a:rPr lang="en-US" b="0" i="0" dirty="0"/>
+              <a:t> latent space, which is the sum of all gene activations for a given pathway (normalized by size of pathway). This is then followed by a two-layer feed forward neural network to predict Gene Dependency Score (continuous between roughly -2.5 and 1).</a:t>
+            </a:r>
+            <a:endParaRPr lang="en-US" dirty="0"/>
+          </a:p>
+        </p:txBody>
+      </p:sp>
+      <p:sp>
+        <p:nvSpPr>
+          <p:cNvPr id="4" name="Slide Number Placeholder 3"/>
+          <p:cNvSpPr>
+            <a:spLocks noGrp="1"/>
+          </p:cNvSpPr>
+          <p:nvPr>
+            <p:ph type="sldNum" sz="quarter" idx="5"/>
+          </p:nvPr>
+        </p:nvSpPr>
+        <p:spPr/>
+        <p:txBody>
+          <a:bodyPr/>
+          <a:lstStyle/>
+          <a:p>
+            <a:fld id="{E02DDEC9-2749-4C81-8CBB-0323C4E5E7CE}" type="slidenum">
+              <a:rPr lang="en-US" smtClean="0"/>
+              <a:t>7</a:t>
+            </a:fld>
+            <a:endParaRPr lang="en-US"/>
+          </a:p>
+        </p:txBody>
+      </p:sp>
+    </p:spTree>
+    <p:extLst>
+      <p:ext uri="{BB962C8B-B14F-4D97-AF65-F5344CB8AC3E}">
+        <p14:creationId xmlns:p14="http://schemas.microsoft.com/office/powerpoint/2010/main" val="1282912815"/>
+      </p:ext>
+    </p:extLst>
+  </p:cSld>
+  <p:clrMapOvr>
+    <a:masterClrMapping/>
+  </p:clrMapOvr>
+</p:notes>
+</file>
+
+<file path=ppt/notesSlides/notesSlide7.xml><?xml version="1.0" encoding="utf-8"?>
+<p:notes xmlns:a="http://schemas.openxmlformats.org/drawingml/2006/main" xmlns:r="http://schemas.openxmlformats.org/officeDocument/2006/relationships" xmlns:p="http://schemas.openxmlformats.org/presentationml/2006/main">
+  <p:cSld>
+    <p:spTree>
+      <p:nvGrpSpPr>
+        <p:cNvPr id="1" name=""/>
+        <p:cNvGrpSpPr/>
+        <p:nvPr/>
+      </p:nvGrpSpPr>
+      <p:grpSpPr>
+        <a:xfrm>
+          <a:off x="0" y="0"/>
+          <a:ext cx="0" cy="0"/>
+          <a:chOff x="0" y="0"/>
+          <a:chExt cx="0" cy="0"/>
+        </a:xfrm>
+      </p:grpSpPr>
+      <p:sp>
+        <p:nvSpPr>
+          <p:cNvPr id="2" name="Slide Image Placeholder 1"/>
+          <p:cNvSpPr>
+            <a:spLocks noGrp="1" noRot="1" noChangeAspect="1"/>
+          </p:cNvSpPr>
+          <p:nvPr>
+            <p:ph type="sldImg"/>
+          </p:nvPr>
+        </p:nvSpPr>
+        <p:spPr/>
+      </p:sp>
+      <p:sp>
+        <p:nvSpPr>
+          <p:cNvPr id="3" name="Notes Placeholder 2"/>
+          <p:cNvSpPr>
+            <a:spLocks noGrp="1"/>
+          </p:cNvSpPr>
+          <p:nvPr>
+            <p:ph type="body" idx="1"/>
+          </p:nvPr>
+        </p:nvSpPr>
+        <p:spPr/>
+        <p:txBody>
+          <a:bodyPr/>
+          <a:lstStyle/>
+          <a:p>
+            <a:r>
+              <a:rPr lang="en-US" dirty="0"/>
+              <a:t>I tested on two holdout datasets, one (top) set was holdout cell-lines, therefore, novel genomes that the model has never seen. Second (bottom) was unique KO genes, thereby novel graph topologies. I’m happy to say that model performance is admirable on both datasets although the hold-out gene KOs seem slightly better. I find the results from the second dataset especially exciting since it indicates that our model does a good job learning the importance of network topology – and suggests that novel KOs or multi-gene KOs may be accurately modeled. </a:t>
+            </a:r>
+          </a:p>
+          <a:p>
+            <a:endParaRPr lang="en-US" dirty="0"/>
+          </a:p>
+          <a:p>
+            <a:r>
+              <a:rPr lang="en-US" dirty="0"/>
+              <a:t>Trained for 100+ sub-epochs [100,000/500,000] on </a:t>
+            </a:r>
+            <a:r>
+              <a:rPr lang="en-US" dirty="0" err="1"/>
+              <a:t>nvidia</a:t>
+            </a:r>
+            <a:r>
+              <a:rPr lang="en-US" dirty="0"/>
+              <a:t> P4000 [8GB mem] + 8 cores [64GB mem], which took 1-2 days. Training took approximately 4ms / observation, and to fit into memory I used batches of 10. </a:t>
+            </a:r>
+          </a:p>
+          <a:p>
+            <a:endParaRPr lang="en-US" dirty="0"/>
+          </a:p>
+          <a:p>
+            <a:r>
+              <a:rPr lang="en-US" dirty="0"/>
+              <a:t>Used the Ranger Optimizer (combination of Lookahead [1] and </a:t>
+            </a:r>
+            <a:r>
+              <a:rPr lang="en-US" dirty="0" err="1"/>
+              <a:t>RAdam</a:t>
+            </a:r>
+            <a:r>
+              <a:rPr lang="en-US" dirty="0"/>
+              <a:t> [2]) along with the mish [3] activation function. </a:t>
+            </a:r>
+          </a:p>
+          <a:p>
+            <a:endParaRPr lang="en-US" dirty="0"/>
+          </a:p>
+          <a:p>
+            <a:r>
+              <a:rPr lang="en-US" dirty="0"/>
+              <a:t>I was still seeing training improvement, however, since I was paying for my compute time I decided to cut off training early. If I was to train longer I would like to implement a cosine annealing learning rate scheduler [4]. </a:t>
+            </a:r>
+          </a:p>
+          <a:p>
+            <a:endParaRPr lang="en-US" dirty="0"/>
+          </a:p>
+          <a:p>
+            <a:r>
+              <a:rPr lang="en-US" dirty="0"/>
+              <a:t>In retrospect, I regret training a regression rather than making this a classification problem. I think it would have trained better and been more interpretable. </a:t>
+            </a:r>
+          </a:p>
+          <a:p>
+            <a:endParaRPr lang="en-US" dirty="0"/>
+          </a:p>
+          <a:p>
+            <a:r>
+              <a:rPr lang="en-US" dirty="0">
+                <a:effectLst/>
+              </a:rPr>
+              <a:t>1. Zhang MR, Lucas J, Hinton G, Ba J. Lookahead Optimizer: k steps forward, 1 step back. arXiv:190708610 [cs, stat] [Internet]. 2019 Dec 3 [cited 2020 Mar 14]; Available from: </a:t>
+            </a:r>
+            <a:r>
+              <a:rPr lang="en-US" dirty="0">
+                <a:effectLst/>
+                <a:hlinkClick r:id="rId3"/>
+              </a:rPr>
+              <a:t>http://arxiv.org/abs/1907.08610</a:t>
+            </a:r>
+            <a:endParaRPr lang="en-US" dirty="0">
+              <a:effectLst/>
+            </a:endParaRPr>
+          </a:p>
+          <a:p>
+            <a:endParaRPr lang="en-US" dirty="0"/>
+          </a:p>
+          <a:p>
+            <a:r>
+              <a:rPr lang="en-US" dirty="0">
+                <a:effectLst/>
+              </a:rPr>
+              <a:t>2. Liu L, Jiang H, He P, Chen W, Liu X, Gao J, et al. On the Variance of the Adaptive Learning Rate and Beyond. arXiv:190803265 [cs, stat] [Internet]. 2020 Mar 9 [cited 2020 Mar 14]; Available from: </a:t>
+            </a:r>
+            <a:r>
+              <a:rPr lang="en-US" dirty="0">
+                <a:effectLst/>
+                <a:hlinkClick r:id="rId4"/>
+              </a:rPr>
+              <a:t>http://arxiv.org/abs/1908.03265</a:t>
+            </a:r>
+            <a:endParaRPr lang="en-US" dirty="0">
+              <a:effectLst/>
+            </a:endParaRPr>
+          </a:p>
+          <a:p>
+            <a:endParaRPr lang="en-US" dirty="0">
+              <a:effectLst/>
+            </a:endParaRPr>
+          </a:p>
+          <a:p>
+            <a:r>
+              <a:rPr lang="en-US" dirty="0">
+                <a:effectLst/>
+              </a:rPr>
+              <a:t>3. </a:t>
+            </a:r>
+            <a:r>
+              <a:rPr lang="en-US" dirty="0" err="1">
+                <a:effectLst/>
+              </a:rPr>
+              <a:t>Misra</a:t>
+            </a:r>
+            <a:r>
+              <a:rPr lang="en-US" dirty="0">
+                <a:effectLst/>
+              </a:rPr>
+              <a:t> D. Mish: A Self Regularized Non-Monotonic Neural Activation Function. arXiv:190808681 [cs, stat] [Internet]. 2019 Oct 2 [cited 2020 Mar 14]; Available from: </a:t>
+            </a:r>
+            <a:r>
+              <a:rPr lang="en-US" dirty="0">
+                <a:effectLst/>
+                <a:hlinkClick r:id="rId5"/>
+              </a:rPr>
+              <a:t>http://arxiv.org/abs/1908.08681</a:t>
+            </a:r>
+            <a:endParaRPr lang="en-US" dirty="0">
+              <a:effectLst/>
+            </a:endParaRPr>
+          </a:p>
+          <a:p>
+            <a:endParaRPr lang="en-US" dirty="0">
+              <a:effectLst/>
+            </a:endParaRPr>
+          </a:p>
+          <a:p>
+            <a:r>
+              <a:rPr lang="en-US" dirty="0">
+                <a:effectLst/>
+              </a:rPr>
+              <a:t>4. </a:t>
+            </a:r>
+            <a:r>
+              <a:rPr lang="en-US" dirty="0" err="1">
+                <a:effectLst/>
+              </a:rPr>
+              <a:t>Loshchilov</a:t>
+            </a:r>
+            <a:r>
+              <a:rPr lang="en-US" dirty="0">
+                <a:effectLst/>
+              </a:rPr>
+              <a:t> I, </a:t>
+            </a:r>
+            <a:r>
+              <a:rPr lang="en-US" dirty="0" err="1">
+                <a:effectLst/>
+              </a:rPr>
+              <a:t>Hutter</a:t>
+            </a:r>
+            <a:r>
+              <a:rPr lang="en-US" dirty="0">
+                <a:effectLst/>
+              </a:rPr>
+              <a:t> F. SGDR: Stochastic Gradient Descent with Warm Restarts. arXiv:160803983 [cs, math] [Internet]. 2017 May 3 [cited 2020 Mar 14]; Available from: </a:t>
+            </a:r>
+            <a:r>
+              <a:rPr lang="en-US" dirty="0">
+                <a:effectLst/>
+                <a:hlinkClick r:id="rId6"/>
+              </a:rPr>
+              <a:t>http://arxiv.org/abs/1608.03983</a:t>
+            </a:r>
+            <a:endParaRPr lang="en-US" dirty="0">
+              <a:effectLst/>
+            </a:endParaRPr>
+          </a:p>
+          <a:p>
+            <a:endParaRPr lang="en-US" dirty="0">
+              <a:effectLst/>
+            </a:endParaRPr>
+          </a:p>
+          <a:p>
+            <a:endParaRPr lang="en-US" dirty="0">
+              <a:effectLst/>
+            </a:endParaRPr>
+          </a:p>
+          <a:p>
+            <a:endParaRPr lang="en-US" dirty="0"/>
+          </a:p>
+        </p:txBody>
+      </p:sp>
+      <p:sp>
+        <p:nvSpPr>
+          <p:cNvPr id="4" name="Slide Number Placeholder 3"/>
+          <p:cNvSpPr>
+            <a:spLocks noGrp="1"/>
+          </p:cNvSpPr>
+          <p:nvPr>
+            <p:ph type="sldNum" sz="quarter" idx="5"/>
+          </p:nvPr>
+        </p:nvSpPr>
+        <p:spPr/>
+        <p:txBody>
+          <a:bodyPr/>
+          <a:lstStyle/>
+          <a:p>
+            <a:fld id="{E02DDEC9-2749-4C81-8CBB-0323C4E5E7CE}" type="slidenum">
+              <a:rPr lang="en-US" smtClean="0"/>
               <a:t>8</a:t>
             </a:fld>
             <a:endParaRPr lang="en-US"/>
@@ -1096,6 +2044,198 @@
     <p:extLst>
       <p:ext uri="{BB962C8B-B14F-4D97-AF65-F5344CB8AC3E}">
         <p14:creationId xmlns:p14="http://schemas.microsoft.com/office/powerpoint/2010/main" val="3535277704"/>
+      </p:ext>
+    </p:extLst>
+  </p:cSld>
+  <p:clrMapOvr>
+    <a:masterClrMapping/>
+  </p:clrMapOvr>
+</p:notes>
+</file>
+
+<file path=ppt/notesSlides/notesSlide8.xml><?xml version="1.0" encoding="utf-8"?>
+<p:notes xmlns:a="http://schemas.openxmlformats.org/drawingml/2006/main" xmlns:r="http://schemas.openxmlformats.org/officeDocument/2006/relationships" xmlns:p="http://schemas.openxmlformats.org/presentationml/2006/main">
+  <p:cSld>
+    <p:spTree>
+      <p:nvGrpSpPr>
+        <p:cNvPr id="1" name=""/>
+        <p:cNvGrpSpPr/>
+        <p:nvPr/>
+      </p:nvGrpSpPr>
+      <p:grpSpPr>
+        <a:xfrm>
+          <a:off x="0" y="0"/>
+          <a:ext cx="0" cy="0"/>
+          <a:chOff x="0" y="0"/>
+          <a:chExt cx="0" cy="0"/>
+        </a:xfrm>
+      </p:grpSpPr>
+      <p:sp>
+        <p:nvSpPr>
+          <p:cNvPr id="2" name="Slide Image Placeholder 1"/>
+          <p:cNvSpPr>
+            <a:spLocks noGrp="1" noRot="1" noChangeAspect="1"/>
+          </p:cNvSpPr>
+          <p:nvPr>
+            <p:ph type="sldImg"/>
+          </p:nvPr>
+        </p:nvSpPr>
+        <p:spPr/>
+      </p:sp>
+      <p:sp>
+        <p:nvSpPr>
+          <p:cNvPr id="3" name="Notes Placeholder 2"/>
+          <p:cNvSpPr>
+            <a:spLocks noGrp="1"/>
+          </p:cNvSpPr>
+          <p:nvPr>
+            <p:ph type="body" idx="1"/>
+          </p:nvPr>
+        </p:nvSpPr>
+        <p:spPr/>
+        <p:txBody>
+          <a:bodyPr/>
+          <a:lstStyle/>
+          <a:p>
+            <a:r>
+              <a:rPr lang="en-US" dirty="0"/>
+              <a:t>Visualizing model learned edge weights. </a:t>
+            </a:r>
+          </a:p>
+          <a:p>
+            <a:endParaRPr lang="en-US" dirty="0"/>
+          </a:p>
+          <a:p>
+            <a:r>
+              <a:rPr lang="en-US" dirty="0"/>
+              <a:t>Not actually sure how to interpret this, but it’s interesting that the lower cluster has so many negative edge weights. Also, that the MAPK cascade isn’t clustered at all, as I had expected it to be. </a:t>
+            </a:r>
+          </a:p>
+        </p:txBody>
+      </p:sp>
+      <p:sp>
+        <p:nvSpPr>
+          <p:cNvPr id="4" name="Slide Number Placeholder 3"/>
+          <p:cNvSpPr>
+            <a:spLocks noGrp="1"/>
+          </p:cNvSpPr>
+          <p:nvPr>
+            <p:ph type="sldNum" sz="quarter" idx="5"/>
+          </p:nvPr>
+        </p:nvSpPr>
+        <p:spPr/>
+        <p:txBody>
+          <a:bodyPr/>
+          <a:lstStyle/>
+          <a:p>
+            <a:fld id="{E02DDEC9-2749-4C81-8CBB-0323C4E5E7CE}" type="slidenum">
+              <a:rPr lang="en-US" smtClean="0"/>
+              <a:t>9</a:t>
+            </a:fld>
+            <a:endParaRPr lang="en-US"/>
+          </a:p>
+        </p:txBody>
+      </p:sp>
+    </p:spTree>
+    <p:extLst>
+      <p:ext uri="{BB962C8B-B14F-4D97-AF65-F5344CB8AC3E}">
+        <p14:creationId xmlns:p14="http://schemas.microsoft.com/office/powerpoint/2010/main" val="4279725437"/>
+      </p:ext>
+    </p:extLst>
+  </p:cSld>
+  <p:clrMapOvr>
+    <a:masterClrMapping/>
+  </p:clrMapOvr>
+</p:notes>
+</file>
+
+<file path=ppt/notesSlides/notesSlide9.xml><?xml version="1.0" encoding="utf-8"?>
+<p:notes xmlns:a="http://schemas.openxmlformats.org/drawingml/2006/main" xmlns:r="http://schemas.openxmlformats.org/officeDocument/2006/relationships" xmlns:p="http://schemas.openxmlformats.org/presentationml/2006/main">
+  <p:cSld>
+    <p:spTree>
+      <p:nvGrpSpPr>
+        <p:cNvPr id="1" name=""/>
+        <p:cNvGrpSpPr/>
+        <p:nvPr/>
+      </p:nvGrpSpPr>
+      <p:grpSpPr>
+        <a:xfrm>
+          <a:off x="0" y="0"/>
+          <a:ext cx="0" cy="0"/>
+          <a:chOff x="0" y="0"/>
+          <a:chExt cx="0" cy="0"/>
+        </a:xfrm>
+      </p:grpSpPr>
+      <p:sp>
+        <p:nvSpPr>
+          <p:cNvPr id="2" name="Slide Image Placeholder 1"/>
+          <p:cNvSpPr>
+            <a:spLocks noGrp="1" noRot="1" noChangeAspect="1"/>
+          </p:cNvSpPr>
+          <p:nvPr>
+            <p:ph type="sldImg"/>
+          </p:nvPr>
+        </p:nvSpPr>
+        <p:spPr/>
+      </p:sp>
+      <p:sp>
+        <p:nvSpPr>
+          <p:cNvPr id="3" name="Notes Placeholder 2"/>
+          <p:cNvSpPr>
+            <a:spLocks noGrp="1"/>
+          </p:cNvSpPr>
+          <p:nvPr>
+            <p:ph type="body" idx="1"/>
+          </p:nvPr>
+        </p:nvSpPr>
+        <p:spPr/>
+        <p:txBody>
+          <a:bodyPr/>
+          <a:lstStyle/>
+          <a:p>
+            <a:r>
+              <a:rPr lang="en-US" dirty="0"/>
+              <a:t>In a GCN, the only way to maintain self-information in a gene from layer to layer is by the self-edge connection. Since I’ve added this coupling component, I made the assumption that self-edge couplings are somewhat analogous to gene/node importance. Building on this assumption, I summed the self-edge weights within each pathway (normalized be pathway size), thereby providing a rough indicator of pathway relevance to the model. </a:t>
+            </a:r>
+          </a:p>
+          <a:p>
+            <a:endParaRPr lang="en-US" dirty="0"/>
+          </a:p>
+          <a:p>
+            <a:r>
+              <a:rPr lang="en-US" dirty="0"/>
+              <a:t>I’m not sure how to interpret negative pathways; negative self-edge weights will invert the node values from GCN layer to layer. Future implementations of this should probably constrain these couplings to between 0 and 1. This would improve interpretability, and might be more robust as well… </a:t>
+            </a:r>
+          </a:p>
+        </p:txBody>
+      </p:sp>
+      <p:sp>
+        <p:nvSpPr>
+          <p:cNvPr id="4" name="Slide Number Placeholder 3"/>
+          <p:cNvSpPr>
+            <a:spLocks noGrp="1"/>
+          </p:cNvSpPr>
+          <p:nvPr>
+            <p:ph type="sldNum" sz="quarter" idx="5"/>
+          </p:nvPr>
+        </p:nvSpPr>
+        <p:spPr/>
+        <p:txBody>
+          <a:bodyPr/>
+          <a:lstStyle/>
+          <a:p>
+            <a:fld id="{E02DDEC9-2749-4C81-8CBB-0323C4E5E7CE}" type="slidenum">
+              <a:rPr lang="en-US" smtClean="0"/>
+              <a:t>10</a:t>
+            </a:fld>
+            <a:endParaRPr lang="en-US"/>
+          </a:p>
+        </p:txBody>
+      </p:sp>
+    </p:spTree>
+    <p:extLst>
+      <p:ext uri="{BB962C8B-B14F-4D97-AF65-F5344CB8AC3E}">
+        <p14:creationId xmlns:p14="http://schemas.microsoft.com/office/powerpoint/2010/main" val="2159518623"/>
       </p:ext>
     </p:extLst>
   </p:cSld>
@@ -1252,7 +2392,7 @@
           <a:p>
             <a:fld id="{45C3DD7F-5439-48F2-B019-AA1C7BD24A14}" type="datetimeFigureOut">
               <a:rPr lang="en-US" smtClean="0"/>
-              <a:t>3/14/2020</a:t>
+              <a:t>3/15/2020</a:t>
             </a:fld>
             <a:endParaRPr lang="en-US"/>
           </a:p>
@@ -1450,7 +2590,7 @@
           <a:p>
             <a:fld id="{45C3DD7F-5439-48F2-B019-AA1C7BD24A14}" type="datetimeFigureOut">
               <a:rPr lang="en-US" smtClean="0"/>
-              <a:t>3/14/2020</a:t>
+              <a:t>3/15/2020</a:t>
             </a:fld>
             <a:endParaRPr lang="en-US"/>
           </a:p>
@@ -1658,7 +2798,7 @@
           <a:p>
             <a:fld id="{45C3DD7F-5439-48F2-B019-AA1C7BD24A14}" type="datetimeFigureOut">
               <a:rPr lang="en-US" smtClean="0"/>
-              <a:t>3/14/2020</a:t>
+              <a:t>3/15/2020</a:t>
             </a:fld>
             <a:endParaRPr lang="en-US"/>
           </a:p>
@@ -1856,7 +2996,7 @@
           <a:p>
             <a:fld id="{45C3DD7F-5439-48F2-B019-AA1C7BD24A14}" type="datetimeFigureOut">
               <a:rPr lang="en-US" smtClean="0"/>
-              <a:t>3/14/2020</a:t>
+              <a:t>3/15/2020</a:t>
             </a:fld>
             <a:endParaRPr lang="en-US"/>
           </a:p>
@@ -2131,7 +3271,7 @@
           <a:p>
             <a:fld id="{45C3DD7F-5439-48F2-B019-AA1C7BD24A14}" type="datetimeFigureOut">
               <a:rPr lang="en-US" smtClean="0"/>
-              <a:t>3/14/2020</a:t>
+              <a:t>3/15/2020</a:t>
             </a:fld>
             <a:endParaRPr lang="en-US"/>
           </a:p>
@@ -2396,7 +3536,7 @@
           <a:p>
             <a:fld id="{45C3DD7F-5439-48F2-B019-AA1C7BD24A14}" type="datetimeFigureOut">
               <a:rPr lang="en-US" smtClean="0"/>
-              <a:t>3/14/2020</a:t>
+              <a:t>3/15/2020</a:t>
             </a:fld>
             <a:endParaRPr lang="en-US"/>
           </a:p>
@@ -2808,7 +3948,7 @@
           <a:p>
             <a:fld id="{45C3DD7F-5439-48F2-B019-AA1C7BD24A14}" type="datetimeFigureOut">
               <a:rPr lang="en-US" smtClean="0"/>
-              <a:t>3/14/2020</a:t>
+              <a:t>3/15/2020</a:t>
             </a:fld>
             <a:endParaRPr lang="en-US"/>
           </a:p>
@@ -2949,7 +4089,7 @@
           <a:p>
             <a:fld id="{45C3DD7F-5439-48F2-B019-AA1C7BD24A14}" type="datetimeFigureOut">
               <a:rPr lang="en-US" smtClean="0"/>
-              <a:t>3/14/2020</a:t>
+              <a:t>3/15/2020</a:t>
             </a:fld>
             <a:endParaRPr lang="en-US"/>
           </a:p>
@@ -3062,7 +4202,7 @@
           <a:p>
             <a:fld id="{45C3DD7F-5439-48F2-B019-AA1C7BD24A14}" type="datetimeFigureOut">
               <a:rPr lang="en-US" smtClean="0"/>
-              <a:t>3/14/2020</a:t>
+              <a:t>3/15/2020</a:t>
             </a:fld>
             <a:endParaRPr lang="en-US"/>
           </a:p>
@@ -3373,7 +4513,7 @@
           <a:p>
             <a:fld id="{45C3DD7F-5439-48F2-B019-AA1C7BD24A14}" type="datetimeFigureOut">
               <a:rPr lang="en-US" smtClean="0"/>
-              <a:t>3/14/2020</a:t>
+              <a:t>3/15/2020</a:t>
             </a:fld>
             <a:endParaRPr lang="en-US"/>
           </a:p>
@@ -3661,7 +4801,7 @@
           <a:p>
             <a:fld id="{45C3DD7F-5439-48F2-B019-AA1C7BD24A14}" type="datetimeFigureOut">
               <a:rPr lang="en-US" smtClean="0"/>
-              <a:t>3/14/2020</a:t>
+              <a:t>3/15/2020</a:t>
             </a:fld>
             <a:endParaRPr lang="en-US"/>
           </a:p>
@@ -3902,7 +5042,7 @@
           <a:p>
             <a:fld id="{45C3DD7F-5439-48F2-B019-AA1C7BD24A14}" type="datetimeFigureOut">
               <a:rPr lang="en-US" smtClean="0"/>
-              <a:t>3/14/2020</a:t>
+              <a:t>3/15/2020</a:t>
             </a:fld>
             <a:endParaRPr lang="en-US"/>
           </a:p>
@@ -4484,7 +5624,7 @@
           <p:nvPr/>
         </p:nvPicPr>
         <p:blipFill>
-          <a:blip r:embed="rId2">
+          <a:blip r:embed="rId3">
             <a:extLst>
               <a:ext uri="{28A0092B-C50C-407E-A947-70E740481C1C}">
                 <a14:useLocalDpi xmlns:a14="http://schemas.microsoft.com/office/drawing/2010/main" val="0"/>
@@ -4561,7 +5701,7 @@
           <p:nvPr/>
         </p:nvPicPr>
         <p:blipFill>
-          <a:blip r:embed="rId2">
+          <a:blip r:embed="rId3">
             <a:extLst>
               <a:ext uri="{28A0092B-C50C-407E-A947-70E740481C1C}">
                 <a14:useLocalDpi xmlns:a14="http://schemas.microsoft.com/office/drawing/2010/main" val="0"/>
@@ -4607,8 +5747,8 @@
         </p:nvSpPr>
         <p:spPr>
           <a:xfrm>
-            <a:off x="8018585" y="826477"/>
-            <a:ext cx="3433953" cy="646331"/>
+            <a:off x="7501750" y="826477"/>
+            <a:ext cx="4035785" cy="1754326"/>
           </a:xfrm>
           <a:prstGeom prst="rect">
             <a:avLst/>
@@ -4627,10 +5767,40 @@
             </a:r>
           </a:p>
           <a:p>
+            <a:pPr marL="285750" indent="-285750">
+              <a:buFontTx/>
+              <a:buChar char="-"/>
+            </a:pPr>
             <a:r>
               <a:rPr lang="en-US" dirty="0"/>
-              <a:t>- Cell lines seems to just be a bias </a:t>
-            </a:r>
+              <a:t>Cell lines seems to just be a bias term </a:t>
+            </a:r>
+          </a:p>
+          <a:p>
+            <a:pPr marL="285750" indent="-285750">
+              <a:buFontTx/>
+              <a:buChar char="-"/>
+            </a:pPr>
+            <a:endParaRPr lang="en-US" dirty="0"/>
+          </a:p>
+          <a:p>
+            <a:r>
+              <a:rPr lang="en-US" dirty="0"/>
+              <a:t>Is this accurate in the real data? </a:t>
+            </a:r>
+          </a:p>
+          <a:p>
+            <a:pPr marL="285750" indent="-285750">
+              <a:buFontTx/>
+              <a:buChar char="-"/>
+            </a:pPr>
+            <a:r>
+              <a:rPr lang="en-US" dirty="0"/>
+              <a:t>More EDA to know </a:t>
+            </a:r>
+          </a:p>
+          <a:p>
+            <a:endParaRPr lang="en-US" dirty="0"/>
           </a:p>
         </p:txBody>
       </p:sp>
@@ -4679,7 +5849,7 @@
           <p:nvPr/>
         </p:nvPicPr>
         <p:blipFill>
-          <a:blip r:embed="rId2">
+          <a:blip r:embed="rId3">
             <a:extLst>
               <a:ext uri="{28A0092B-C50C-407E-A947-70E740481C1C}">
                 <a14:useLocalDpi xmlns:a14="http://schemas.microsoft.com/office/drawing/2010/main" val="0"/>
@@ -4726,7 +5896,7 @@
           <p:nvPr/>
         </p:nvPicPr>
         <p:blipFill>
-          <a:blip r:embed="rId3">
+          <a:blip r:embed="rId4">
             <a:extLst>
               <a:ext uri="{28A0092B-C50C-407E-A947-70E740481C1C}">
                 <a14:useLocalDpi xmlns:a14="http://schemas.microsoft.com/office/drawing/2010/main" val="0"/>
@@ -4913,7 +6083,7 @@
           <p:nvPr/>
         </p:nvPicPr>
         <p:blipFill>
-          <a:blip r:embed="rId2">
+          <a:blip r:embed="rId3">
             <a:extLst>
               <a:ext uri="{28A0092B-C50C-407E-A947-70E740481C1C}">
                 <a14:useLocalDpi xmlns:a14="http://schemas.microsoft.com/office/drawing/2010/main" val="0"/>
@@ -4960,7 +6130,7 @@
           <p:nvPr/>
         </p:nvPicPr>
         <p:blipFill>
-          <a:blip r:embed="rId3">
+          <a:blip r:embed="rId4">
             <a:extLst>
               <a:ext uri="{28A0092B-C50C-407E-A947-70E740481C1C}">
                 <a14:useLocalDpi xmlns:a14="http://schemas.microsoft.com/office/drawing/2010/main" val="0"/>
@@ -5148,7 +6318,7 @@
           <p:nvPr/>
         </p:nvPicPr>
         <p:blipFill>
-          <a:blip r:embed="rId2">
+          <a:blip r:embed="rId3">
             <a:extLst>
               <a:ext uri="{28A0092B-C50C-407E-A947-70E740481C1C}">
                 <a14:useLocalDpi xmlns:a14="http://schemas.microsoft.com/office/drawing/2010/main" val="0"/>
@@ -6071,7 +7241,7 @@
             </a:pPr>
             <a:r>
               <a:rPr lang="en-US" dirty="0">
-                <a:hlinkClick r:id="rId2"/>
+                <a:hlinkClick r:id="rId3"/>
               </a:rPr>
               <a:t>https://depmap.org/portal/</a:t>
             </a:r>
@@ -9116,7 +10286,7 @@
           <a:p>
             <a:r>
               <a:rPr lang="en-US" dirty="0"/>
-              <a:t>Graph Convolutional Network</a:t>
+              <a:t>Graph Convolutional Network (GCN)</a:t>
             </a:r>
           </a:p>
         </p:txBody>
@@ -9136,7 +10306,7 @@
           <p:nvPr/>
         </p:nvPicPr>
         <p:blipFill>
-          <a:blip r:embed="rId2">
+          <a:blip r:embed="rId3">
             <a:extLst>
               <a:ext uri="{28A0092B-C50C-407E-A947-70E740481C1C}">
                 <a14:useLocalDpi xmlns:a14="http://schemas.microsoft.com/office/drawing/2010/main" val="0"/>
@@ -12309,8 +13479,8 @@
           </a:fontRef>
         </p:style>
       </p:cxnSp>
-      <mc:AlternateContent xmlns:mc="http://schemas.openxmlformats.org/markup-compatibility/2006">
-        <mc:Choice xmlns:a14="http://schemas.microsoft.com/office/drawing/2010/main" Requires="a14">
+      <mc:AlternateContent xmlns:mc="http://schemas.openxmlformats.org/markup-compatibility/2006" xmlns:a14="http://schemas.microsoft.com/office/drawing/2010/main">
+        <mc:Choice Requires="a14">
           <p:sp>
             <p:nvSpPr>
               <p:cNvPr id="14" name="TextBox 13">
@@ -12514,7 +13684,7 @@
             </p:txBody>
           </p:sp>
         </mc:Choice>
-        <mc:Fallback>
+        <mc:Fallback xmlns="">
           <p:sp>
             <p:nvSpPr>
               <p:cNvPr id="14" name="TextBox 13">
@@ -12538,7 +13708,7 @@
                 <a:avLst/>
               </a:prstGeom>
               <a:blipFill>
-                <a:blip r:embed="rId2"/>
+                <a:blip r:embed="rId3"/>
                 <a:stretch>
                   <a:fillRect l="-3111" t="-15079"/>
                 </a:stretch>
@@ -12559,8 +13729,8 @@
           </p:sp>
         </mc:Fallback>
       </mc:AlternateContent>
-      <mc:AlternateContent xmlns:mc="http://schemas.openxmlformats.org/markup-compatibility/2006">
-        <mc:Choice xmlns:a14="http://schemas.microsoft.com/office/drawing/2010/main" Requires="a14">
+      <mc:AlternateContent xmlns:mc="http://schemas.openxmlformats.org/markup-compatibility/2006" xmlns:a14="http://schemas.microsoft.com/office/drawing/2010/main">
+        <mc:Choice Requires="a14">
           <p:sp>
             <p:nvSpPr>
               <p:cNvPr id="31" name="TextBox 30">
@@ -12589,6 +13759,7 @@
               </a:bodyPr>
               <a:lstStyle/>
               <a:p>
+                <a:pPr/>
                 <a14:m>
                   <m:oMathPara xmlns:m="http://schemas.openxmlformats.org/officeDocument/2006/math">
                     <m:oMathParaPr>
@@ -12628,7 +13799,7 @@
             </p:txBody>
           </p:sp>
         </mc:Choice>
-        <mc:Fallback>
+        <mc:Fallback xmlns="">
           <p:sp>
             <p:nvSpPr>
               <p:cNvPr id="31" name="TextBox 30">
@@ -12652,7 +13823,7 @@
                 <a:avLst/>
               </a:prstGeom>
               <a:blipFill>
-                <a:blip r:embed="rId3"/>
+                <a:blip r:embed="rId4"/>
                 <a:stretch>
                   <a:fillRect l="-10345" r="-5172" b="-17778"/>
                 </a:stretch>
@@ -12673,8 +13844,8 @@
           </p:sp>
         </mc:Fallback>
       </mc:AlternateContent>
-      <mc:AlternateContent xmlns:mc="http://schemas.openxmlformats.org/markup-compatibility/2006">
-        <mc:Choice xmlns:a14="http://schemas.microsoft.com/office/drawing/2010/main" Requires="a14">
+      <mc:AlternateContent xmlns:mc="http://schemas.openxmlformats.org/markup-compatibility/2006" xmlns:a14="http://schemas.microsoft.com/office/drawing/2010/main">
+        <mc:Choice Requires="a14">
           <p:sp>
             <p:nvSpPr>
               <p:cNvPr id="32" name="TextBox 31">
@@ -12703,6 +13874,7 @@
               </a:bodyPr>
               <a:lstStyle/>
               <a:p>
+                <a:pPr/>
                 <a14:m>
                   <m:oMathPara xmlns:m="http://schemas.openxmlformats.org/officeDocument/2006/math">
                     <m:oMathParaPr>
@@ -12742,7 +13914,7 @@
             </p:txBody>
           </p:sp>
         </mc:Choice>
-        <mc:Fallback>
+        <mc:Fallback xmlns="">
           <p:sp>
             <p:nvSpPr>
               <p:cNvPr id="32" name="TextBox 31">
@@ -12766,7 +13938,7 @@
                 <a:avLst/>
               </a:prstGeom>
               <a:blipFill>
-                <a:blip r:embed="rId4"/>
+                <a:blip r:embed="rId5"/>
                 <a:stretch>
                   <a:fillRect l="-8065" r="-6452" b="-15217"/>
                 </a:stretch>
@@ -12787,8 +13959,8 @@
           </p:sp>
         </mc:Fallback>
       </mc:AlternateContent>
-      <mc:AlternateContent xmlns:mc="http://schemas.openxmlformats.org/markup-compatibility/2006">
-        <mc:Choice xmlns:a14="http://schemas.microsoft.com/office/drawing/2010/main" Requires="a14">
+      <mc:AlternateContent xmlns:mc="http://schemas.openxmlformats.org/markup-compatibility/2006" xmlns:a14="http://schemas.microsoft.com/office/drawing/2010/main">
+        <mc:Choice Requires="a14">
           <p:sp>
             <p:nvSpPr>
               <p:cNvPr id="35" name="TextBox 34">
@@ -12817,6 +13989,7 @@
               </a:bodyPr>
               <a:lstStyle/>
               <a:p>
+                <a:pPr/>
                 <a14:m>
                   <m:oMathPara xmlns:m="http://schemas.openxmlformats.org/officeDocument/2006/math">
                     <m:oMathParaPr>
@@ -12856,7 +14029,7 @@
             </p:txBody>
           </p:sp>
         </mc:Choice>
-        <mc:Fallback>
+        <mc:Fallback xmlns="">
           <p:sp>
             <p:nvSpPr>
               <p:cNvPr id="35" name="TextBox 34">
@@ -12880,7 +14053,7 @@
                 <a:avLst/>
               </a:prstGeom>
               <a:blipFill>
-                <a:blip r:embed="rId5"/>
+                <a:blip r:embed="rId6"/>
                 <a:stretch>
                   <a:fillRect l="-8197" r="-6557" b="-15217"/>
                 </a:stretch>
@@ -12901,8 +14074,8 @@
           </p:sp>
         </mc:Fallback>
       </mc:AlternateContent>
-      <mc:AlternateContent xmlns:mc="http://schemas.openxmlformats.org/markup-compatibility/2006">
-        <mc:Choice xmlns:a14="http://schemas.microsoft.com/office/drawing/2010/main" Requires="a14">
+      <mc:AlternateContent xmlns:mc="http://schemas.openxmlformats.org/markup-compatibility/2006" xmlns:a14="http://schemas.microsoft.com/office/drawing/2010/main">
+        <mc:Choice Requires="a14">
           <p:sp>
             <p:nvSpPr>
               <p:cNvPr id="19" name="Rectangle 18">
@@ -13097,7 +14270,7 @@
             </p:txBody>
           </p:sp>
         </mc:Choice>
-        <mc:Fallback>
+        <mc:Fallback xmlns="">
           <p:sp>
             <p:nvSpPr>
               <p:cNvPr id="19" name="Rectangle 18">
@@ -13121,7 +14294,7 @@
                 <a:avLst/>
               </a:prstGeom>
               <a:blipFill>
-                <a:blip r:embed="rId6"/>
+                <a:blip r:embed="rId7"/>
                 <a:stretch>
                   <a:fillRect l="-1667" t="-11340" b="-34021"/>
                 </a:stretch>
@@ -13142,8 +14315,8 @@
           </p:sp>
         </mc:Fallback>
       </mc:AlternateContent>
-      <mc:AlternateContent xmlns:mc="http://schemas.openxmlformats.org/markup-compatibility/2006">
-        <mc:Choice xmlns:a14="http://schemas.microsoft.com/office/drawing/2010/main" Requires="a14">
+      <mc:AlternateContent xmlns:mc="http://schemas.openxmlformats.org/markup-compatibility/2006" xmlns:a14="http://schemas.microsoft.com/office/drawing/2010/main">
+        <mc:Choice Requires="a14">
           <p:sp>
             <p:nvSpPr>
               <p:cNvPr id="36" name="TextBox 35">
@@ -13256,13 +14429,7 @@
                               <a:rPr lang="en-US" sz="2400" b="0" i="1" smtClean="0">
                                 <a:latin typeface="Cambria Math" panose="02040503050406030204" pitchFamily="18" charset="0"/>
                               </a:rPr>
-                              <m:t>0</m:t>
-                            </m:r>
-                            <m:r>
-                              <a:rPr lang="en-US" sz="2400" b="0" i="1" smtClean="0">
-                                <a:latin typeface="Cambria Math" panose="02040503050406030204" pitchFamily="18" charset="0"/>
-                              </a:rPr>
-                              <m:t> </m:t>
+                              <m:t>0 </m:t>
                             </m:r>
                           </m:e>
                         </m:mr>
@@ -13422,7 +14589,7 @@
             </p:txBody>
           </p:sp>
         </mc:Choice>
-        <mc:Fallback>
+        <mc:Fallback xmlns="">
           <p:sp>
             <p:nvSpPr>
               <p:cNvPr id="36" name="TextBox 35">
@@ -13446,7 +14613,7 @@
                 <a:avLst/>
               </a:prstGeom>
               <a:blipFill>
-                <a:blip r:embed="rId7"/>
+                <a:blip r:embed="rId8"/>
                 <a:stretch>
                   <a:fillRect/>
                 </a:stretch>
@@ -13575,8 +14742,8 @@
           </a:p>
         </p:txBody>
       </p:sp>
-      <mc:AlternateContent xmlns:mc="http://schemas.openxmlformats.org/markup-compatibility/2006">
-        <mc:Choice xmlns:a14="http://schemas.microsoft.com/office/drawing/2010/main" Requires="a14">
+      <mc:AlternateContent xmlns:mc="http://schemas.openxmlformats.org/markup-compatibility/2006" xmlns:a14="http://schemas.microsoft.com/office/drawing/2010/main">
+        <mc:Choice Requires="a14">
           <p:sp>
             <p:nvSpPr>
               <p:cNvPr id="22" name="TextBox 21">
@@ -13643,7 +14810,7 @@
             </p:txBody>
           </p:sp>
         </mc:Choice>
-        <mc:Fallback>
+        <mc:Fallback xmlns="">
           <p:sp>
             <p:nvSpPr>
               <p:cNvPr id="22" name="TextBox 21">
@@ -13667,7 +14834,7 @@
                 <a:avLst/>
               </a:prstGeom>
               <a:blipFill>
-                <a:blip r:embed="rId8"/>
+                <a:blip r:embed="rId9"/>
                 <a:stretch>
                   <a:fillRect t="-14151" r="-15263" b="-34906"/>
                 </a:stretch>
@@ -13782,8 +14949,8 @@
           </a:p>
         </p:txBody>
       </p:sp>
-      <mc:AlternateContent xmlns:mc="http://schemas.openxmlformats.org/markup-compatibility/2006">
-        <mc:Choice xmlns:a14="http://schemas.microsoft.com/office/drawing/2010/main" Requires="a14">
+      <mc:AlternateContent xmlns:mc="http://schemas.openxmlformats.org/markup-compatibility/2006" xmlns:a14="http://schemas.microsoft.com/office/drawing/2010/main">
+        <mc:Choice Requires="a14">
           <p:sp>
             <p:nvSpPr>
               <p:cNvPr id="25" name="Rectangle 24">
@@ -13936,7 +15103,7 @@
             </p:txBody>
           </p:sp>
         </mc:Choice>
-        <mc:Fallback>
+        <mc:Fallback xmlns="">
           <p:sp>
             <p:nvSpPr>
               <p:cNvPr id="25" name="Rectangle 24">
@@ -13960,7 +15127,7 @@
                 <a:avLst/>
               </a:prstGeom>
               <a:blipFill>
-                <a:blip r:embed="rId9"/>
+                <a:blip r:embed="rId10"/>
                 <a:stretch>
                   <a:fillRect l="-1531" t="-12500" b="-34375"/>
                 </a:stretch>
@@ -13981,8 +15148,8 @@
           </p:sp>
         </mc:Fallback>
       </mc:AlternateContent>
-      <mc:AlternateContent xmlns:mc="http://schemas.openxmlformats.org/markup-compatibility/2006">
-        <mc:Choice xmlns:a14="http://schemas.microsoft.com/office/drawing/2010/main" Requires="a14">
+      <mc:AlternateContent xmlns:mc="http://schemas.openxmlformats.org/markup-compatibility/2006" xmlns:a14="http://schemas.microsoft.com/office/drawing/2010/main">
+        <mc:Choice Requires="a14">
           <p:sp>
             <p:nvSpPr>
               <p:cNvPr id="28" name="TextBox 27">
@@ -14011,6 +15178,7 @@
               </a:bodyPr>
               <a:lstStyle/>
               <a:p>
+                <a:pPr/>
                 <a14:m>
                   <m:oMathPara xmlns:m="http://schemas.openxmlformats.org/officeDocument/2006/math">
                     <m:oMathParaPr>
@@ -14050,7 +15218,7 @@
             </p:txBody>
           </p:sp>
         </mc:Choice>
-        <mc:Fallback>
+        <mc:Fallback xmlns="">
           <p:sp>
             <p:nvSpPr>
               <p:cNvPr id="28" name="TextBox 27">
@@ -14074,7 +15242,7 @@
                 <a:avLst/>
               </a:prstGeom>
               <a:blipFill>
-                <a:blip r:embed="rId10"/>
+                <a:blip r:embed="rId11"/>
                 <a:stretch>
                   <a:fillRect l="-3846" b="-10667"/>
                 </a:stretch>
@@ -15004,14 +16172,14 @@
           <p:nvPr/>
         </p:nvPicPr>
         <p:blipFill>
-          <a:blip r:embed="rId2"/>
+          <a:blip r:embed="rId3"/>
           <a:stretch>
             <a:fillRect/>
           </a:stretch>
         </p:blipFill>
         <p:spPr>
           <a:xfrm>
-            <a:off x="0" y="147637"/>
+            <a:off x="1470454" y="147637"/>
             <a:ext cx="8524875" cy="6562725"/>
           </a:xfrm>
           <a:prstGeom prst="rect">
@@ -15033,7 +16201,7 @@
         </p:nvGrpSpPr>
         <p:grpSpPr>
           <a:xfrm>
-            <a:off x="8524875" y="147637"/>
+            <a:off x="9995329" y="147637"/>
             <a:ext cx="1299549" cy="1325563"/>
             <a:chOff x="4529751" y="3307068"/>
             <a:chExt cx="1532434" cy="1751960"/>
@@ -15864,7 +17032,7 @@
         <p:spPr>
           <a:xfrm>
             <a:off x="7629525" y="2124075"/>
-            <a:ext cx="3801169" cy="1477328"/>
+            <a:ext cx="4264501" cy="1477328"/>
           </a:xfrm>
           <a:prstGeom prst="rect">
             <a:avLst/>
@@ -15916,7 +17084,7 @@
           <a:p>
             <a:r>
               <a:rPr lang="en-US" dirty="0"/>
-              <a:t>Green outline = MAPK cascade </a:t>
+              <a:t>Green outline = MAPK cascade GO pathway</a:t>
             </a:r>
           </a:p>
         </p:txBody>
@@ -15936,7 +17104,7 @@
           <p:nvPr/>
         </p:nvPicPr>
         <p:blipFill>
-          <a:blip r:embed="rId2">
+          <a:blip r:embed="rId3">
             <a:extLst>
               <a:ext uri="{28A0092B-C50C-407E-A947-70E740481C1C}">
                 <a14:useLocalDpi xmlns:a14="http://schemas.microsoft.com/office/drawing/2010/main" val="0"/>

</xml_diff>